<commit_message>
Update plot margins for x axis and then update tests
</commit_message>
<xml_diff>
--- a/tests/testthat/multi_slide_fullslide.pptx
+++ b/tests/testthat/multi_slide_fullslide.pptx
@@ -510,7 +510,7 @@
             <a:r>
               <a:rPr/>
               <a:t>
-Powerpoint file location: C:\Users\parkinsonn\Documents\grattantheme\tests\testthat\multi_slide_fullslide.pptx</a:t>
+Powerpoint file location: /Users/mbbowes/Documents/GitHub/grattantheme/tests/testthat/multi_slide_fullslide.pptx</a:t>
             </a:r>
           </a:p>
         </p:txBody>
@@ -558,7 +558,7 @@
             <a:r>
               <a:rPr/>
               <a:t>
-Powerpoint file location: C:\Users\parkinsonn\Documents\grattantheme\tests\testthat\multi_slide_fullslide.pptx</a:t>
+Powerpoint file location: /Users/mbbowes/Documents/GitHub/grattantheme/tests/testthat/multi_slide_fullslide.pptx</a:t>
             </a:r>
           </a:p>
         </p:txBody>
@@ -3489,8 +3489,8 @@
           </p:nvSpPr>
           <p:spPr>
             <a:xfrm>
-              <a:off x="792199" y="1877752"/>
-              <a:ext cx="10922224" cy="3815139"/>
+              <a:off x="793905" y="1877752"/>
+              <a:ext cx="10920518" cy="3812069"/>
             </a:xfrm>
             <a:prstGeom prst="rect">
               <a:avLst/>
@@ -3515,21 +3515,21 @@
           </p:nvSpPr>
           <p:spPr>
             <a:xfrm>
-              <a:off x="792199" y="5209542"/>
-              <a:ext cx="10922224" cy="0"/>
+              <a:off x="793905" y="5206861"/>
+              <a:ext cx="10920518" cy="0"/>
             </a:xfrm>
             <a:custGeom>
               <a:avLst/>
               <a:pathLst>
-                <a:path w="10922224" h="0">
+                <a:path w="10920518" h="0">
                   <a:moveTo>
                     <a:pt x="0" y="0"/>
                   </a:moveTo>
                   <a:lnTo>
-                    <a:pt x="10922224" y="0"/>
+                    <a:pt x="10920518" y="0"/>
                   </a:lnTo>
                   <a:lnTo>
-                    <a:pt x="10922224" y="0"/>
+                    <a:pt x="10920518" y="0"/>
                   </a:lnTo>
                 </a:path>
               </a:pathLst>
@@ -3558,21 +3558,21 @@
           </p:nvSpPr>
           <p:spPr>
             <a:xfrm>
-              <a:off x="792199" y="4471604"/>
-              <a:ext cx="10922224" cy="0"/>
+              <a:off x="793905" y="4469517"/>
+              <a:ext cx="10920518" cy="0"/>
             </a:xfrm>
             <a:custGeom>
               <a:avLst/>
               <a:pathLst>
-                <a:path w="10922224" h="0">
+                <a:path w="10920518" h="0">
                   <a:moveTo>
                     <a:pt x="0" y="0"/>
                   </a:moveTo>
                   <a:lnTo>
-                    <a:pt x="10922224" y="0"/>
+                    <a:pt x="10920518" y="0"/>
                   </a:lnTo>
                   <a:lnTo>
-                    <a:pt x="10922224" y="0"/>
+                    <a:pt x="10920518" y="0"/>
                   </a:lnTo>
                 </a:path>
               </a:pathLst>
@@ -3601,21 +3601,21 @@
           </p:nvSpPr>
           <p:spPr>
             <a:xfrm>
-              <a:off x="792199" y="3733666"/>
-              <a:ext cx="10922224" cy="0"/>
+              <a:off x="793905" y="3732172"/>
+              <a:ext cx="10920518" cy="0"/>
             </a:xfrm>
             <a:custGeom>
               <a:avLst/>
               <a:pathLst>
-                <a:path w="10922224" h="0">
+                <a:path w="10920518" h="0">
                   <a:moveTo>
                     <a:pt x="0" y="0"/>
                   </a:moveTo>
                   <a:lnTo>
-                    <a:pt x="10922224" y="0"/>
+                    <a:pt x="10920518" y="0"/>
                   </a:lnTo>
                   <a:lnTo>
-                    <a:pt x="10922224" y="0"/>
+                    <a:pt x="10920518" y="0"/>
                   </a:lnTo>
                 </a:path>
               </a:pathLst>
@@ -3644,21 +3644,21 @@
           </p:nvSpPr>
           <p:spPr>
             <a:xfrm>
-              <a:off x="792199" y="2995728"/>
-              <a:ext cx="10922224" cy="0"/>
+              <a:off x="793905" y="2994828"/>
+              <a:ext cx="10920518" cy="0"/>
             </a:xfrm>
             <a:custGeom>
               <a:avLst/>
               <a:pathLst>
-                <a:path w="10922224" h="0">
+                <a:path w="10920518" h="0">
                   <a:moveTo>
                     <a:pt x="0" y="0"/>
                   </a:moveTo>
                   <a:lnTo>
-                    <a:pt x="10922224" y="0"/>
+                    <a:pt x="10920518" y="0"/>
                   </a:lnTo>
                   <a:lnTo>
-                    <a:pt x="10922224" y="0"/>
+                    <a:pt x="10920518" y="0"/>
                   </a:lnTo>
                 </a:path>
               </a:pathLst>
@@ -3687,21 +3687,21 @@
           </p:nvSpPr>
           <p:spPr>
             <a:xfrm>
-              <a:off x="792199" y="2257790"/>
-              <a:ext cx="10922224" cy="0"/>
+              <a:off x="793905" y="2257484"/>
+              <a:ext cx="10920518" cy="0"/>
             </a:xfrm>
             <a:custGeom>
               <a:avLst/>
               <a:pathLst>
-                <a:path w="10922224" h="0">
+                <a:path w="10920518" h="0">
                   <a:moveTo>
                     <a:pt x="0" y="0"/>
                   </a:moveTo>
                   <a:lnTo>
-                    <a:pt x="10922224" y="0"/>
+                    <a:pt x="10920518" y="0"/>
                   </a:lnTo>
                   <a:lnTo>
-                    <a:pt x="10922224" y="0"/>
+                    <a:pt x="10920518" y="0"/>
                   </a:lnTo>
                 </a:path>
               </a:pathLst>
@@ -3730,15 +3730,15 @@
           </p:nvSpPr>
           <p:spPr>
             <a:xfrm>
-              <a:off x="1255659" y="1877752"/>
-              <a:ext cx="0" cy="3815139"/>
+              <a:off x="1257292" y="1877752"/>
+              <a:ext cx="0" cy="3812069"/>
             </a:xfrm>
             <a:custGeom>
               <a:avLst/>
               <a:pathLst>
-                <a:path w="0" h="3815139">
+                <a:path w="0" h="3812069">
                   <a:moveTo>
-                    <a:pt x="0" y="3815139"/>
+                    <a:pt x="0" y="3812069"/>
                   </a:moveTo>
                   <a:lnTo>
                     <a:pt x="0" y="0"/>
@@ -3773,15 +3773,15 @@
           </p:nvSpPr>
           <p:spPr>
             <a:xfrm>
-              <a:off x="3794472" y="1877752"/>
-              <a:ext cx="0" cy="3815139"/>
+              <a:off x="3795708" y="1877752"/>
+              <a:ext cx="0" cy="3812069"/>
             </a:xfrm>
             <a:custGeom>
               <a:avLst/>
               <a:pathLst>
-                <a:path w="0" h="3815139">
+                <a:path w="0" h="3812069">
                   <a:moveTo>
-                    <a:pt x="0" y="3815139"/>
+                    <a:pt x="0" y="3812069"/>
                   </a:moveTo>
                   <a:lnTo>
                     <a:pt x="0" y="0"/>
@@ -3816,15 +3816,15 @@
           </p:nvSpPr>
           <p:spPr>
             <a:xfrm>
-              <a:off x="6333284" y="1877752"/>
-              <a:ext cx="0" cy="3815139"/>
+              <a:off x="6334124" y="1877752"/>
+              <a:ext cx="0" cy="3812069"/>
             </a:xfrm>
             <a:custGeom>
               <a:avLst/>
               <a:pathLst>
-                <a:path w="0" h="3815139">
+                <a:path w="0" h="3812069">
                   <a:moveTo>
-                    <a:pt x="0" y="3815139"/>
+                    <a:pt x="0" y="3812069"/>
                   </a:moveTo>
                   <a:lnTo>
                     <a:pt x="0" y="0"/>
@@ -3859,15 +3859,15 @@
           </p:nvSpPr>
           <p:spPr>
             <a:xfrm>
-              <a:off x="8872096" y="1877752"/>
-              <a:ext cx="0" cy="3815139"/>
+              <a:off x="8872540" y="1877752"/>
+              <a:ext cx="0" cy="3812069"/>
             </a:xfrm>
             <a:custGeom>
               <a:avLst/>
               <a:pathLst>
-                <a:path w="0" h="3815139">
+                <a:path w="0" h="3812069">
                   <a:moveTo>
-                    <a:pt x="0" y="3815139"/>
+                    <a:pt x="0" y="3812069"/>
                   </a:moveTo>
                   <a:lnTo>
                     <a:pt x="0" y="0"/>
@@ -3902,15 +3902,15 @@
           </p:nvSpPr>
           <p:spPr>
             <a:xfrm>
-              <a:off x="11410908" y="1877752"/>
-              <a:ext cx="0" cy="3815139"/>
+              <a:off x="11410956" y="1877752"/>
+              <a:ext cx="0" cy="3812069"/>
             </a:xfrm>
             <a:custGeom>
               <a:avLst/>
               <a:pathLst>
-                <a:path w="0" h="3815139">
+                <a:path w="0" h="3812069">
                   <a:moveTo>
-                    <a:pt x="0" y="3815139"/>
+                    <a:pt x="0" y="3812069"/>
                   </a:moveTo>
                   <a:lnTo>
                     <a:pt x="0" y="0"/>
@@ -3945,21 +3945,21 @@
           </p:nvSpPr>
           <p:spPr>
             <a:xfrm>
-              <a:off x="792199" y="5578511"/>
-              <a:ext cx="10922224" cy="0"/>
+              <a:off x="793905" y="5575533"/>
+              <a:ext cx="10920518" cy="0"/>
             </a:xfrm>
             <a:custGeom>
               <a:avLst/>
               <a:pathLst>
-                <a:path w="10922224" h="0">
+                <a:path w="10920518" h="0">
                   <a:moveTo>
                     <a:pt x="0" y="0"/>
                   </a:moveTo>
                   <a:lnTo>
-                    <a:pt x="10922224" y="0"/>
+                    <a:pt x="10920518" y="0"/>
                   </a:lnTo>
                   <a:lnTo>
-                    <a:pt x="10922224" y="0"/>
+                    <a:pt x="10920518" y="0"/>
                   </a:lnTo>
                 </a:path>
               </a:pathLst>
@@ -3988,21 +3988,21 @@
           </p:nvSpPr>
           <p:spPr>
             <a:xfrm>
-              <a:off x="792199" y="4840573"/>
-              <a:ext cx="10922224" cy="0"/>
+              <a:off x="793905" y="4838189"/>
+              <a:ext cx="10920518" cy="0"/>
             </a:xfrm>
             <a:custGeom>
               <a:avLst/>
               <a:pathLst>
-                <a:path w="10922224" h="0">
+                <a:path w="10920518" h="0">
                   <a:moveTo>
                     <a:pt x="0" y="0"/>
                   </a:moveTo>
                   <a:lnTo>
-                    <a:pt x="10922224" y="0"/>
+                    <a:pt x="10920518" y="0"/>
                   </a:lnTo>
                   <a:lnTo>
-                    <a:pt x="10922224" y="0"/>
+                    <a:pt x="10920518" y="0"/>
                   </a:lnTo>
                 </a:path>
               </a:pathLst>
@@ -4031,21 +4031,21 @@
           </p:nvSpPr>
           <p:spPr>
             <a:xfrm>
-              <a:off x="792199" y="4102635"/>
-              <a:ext cx="10922224" cy="0"/>
+              <a:off x="793905" y="4100845"/>
+              <a:ext cx="10920518" cy="0"/>
             </a:xfrm>
             <a:custGeom>
               <a:avLst/>
               <a:pathLst>
-                <a:path w="10922224" h="0">
+                <a:path w="10920518" h="0">
                   <a:moveTo>
                     <a:pt x="0" y="0"/>
                   </a:moveTo>
                   <a:lnTo>
-                    <a:pt x="10922224" y="0"/>
+                    <a:pt x="10920518" y="0"/>
                   </a:lnTo>
                   <a:lnTo>
-                    <a:pt x="10922224" y="0"/>
+                    <a:pt x="10920518" y="0"/>
                   </a:lnTo>
                 </a:path>
               </a:pathLst>
@@ -4074,21 +4074,21 @@
           </p:nvSpPr>
           <p:spPr>
             <a:xfrm>
-              <a:off x="792199" y="3364697"/>
-              <a:ext cx="10922224" cy="0"/>
+              <a:off x="793905" y="3363500"/>
+              <a:ext cx="10920518" cy="0"/>
             </a:xfrm>
             <a:custGeom>
               <a:avLst/>
               <a:pathLst>
-                <a:path w="10922224" h="0">
+                <a:path w="10920518" h="0">
                   <a:moveTo>
                     <a:pt x="0" y="0"/>
                   </a:moveTo>
                   <a:lnTo>
-                    <a:pt x="10922224" y="0"/>
+                    <a:pt x="10920518" y="0"/>
                   </a:lnTo>
                   <a:lnTo>
-                    <a:pt x="10922224" y="0"/>
+                    <a:pt x="10920518" y="0"/>
                   </a:lnTo>
                 </a:path>
               </a:pathLst>
@@ -4117,21 +4117,21 @@
           </p:nvSpPr>
           <p:spPr>
             <a:xfrm>
-              <a:off x="792199" y="2626759"/>
-              <a:ext cx="10922224" cy="0"/>
+              <a:off x="793905" y="2626156"/>
+              <a:ext cx="10920518" cy="0"/>
             </a:xfrm>
             <a:custGeom>
               <a:avLst/>
               <a:pathLst>
-                <a:path w="10922224" h="0">
+                <a:path w="10920518" h="0">
                   <a:moveTo>
                     <a:pt x="0" y="0"/>
                   </a:moveTo>
                   <a:lnTo>
-                    <a:pt x="10922224" y="0"/>
+                    <a:pt x="10920518" y="0"/>
                   </a:lnTo>
                   <a:lnTo>
-                    <a:pt x="10922224" y="0"/>
+                    <a:pt x="10920518" y="0"/>
                   </a:lnTo>
                 </a:path>
               </a:pathLst>
@@ -4160,21 +4160,21 @@
           </p:nvSpPr>
           <p:spPr>
             <a:xfrm>
-              <a:off x="792199" y="1888821"/>
-              <a:ext cx="10922224" cy="0"/>
+              <a:off x="793905" y="1888812"/>
+              <a:ext cx="10920518" cy="0"/>
             </a:xfrm>
             <a:custGeom>
               <a:avLst/>
               <a:pathLst>
-                <a:path w="10922224" h="0">
+                <a:path w="10920518" h="0">
                   <a:moveTo>
                     <a:pt x="0" y="0"/>
                   </a:moveTo>
                   <a:lnTo>
-                    <a:pt x="10922224" y="0"/>
+                    <a:pt x="10920518" y="0"/>
                   </a:lnTo>
                   <a:lnTo>
-                    <a:pt x="10922224" y="0"/>
+                    <a:pt x="10920518" y="0"/>
                   </a:lnTo>
                 </a:path>
               </a:pathLst>
@@ -4203,15 +4203,15 @@
           </p:nvSpPr>
           <p:spPr>
             <a:xfrm>
-              <a:off x="2525066" y="1877752"/>
-              <a:ext cx="0" cy="3815139"/>
+              <a:off x="2526500" y="1877752"/>
+              <a:ext cx="0" cy="3812069"/>
             </a:xfrm>
             <a:custGeom>
               <a:avLst/>
               <a:pathLst>
-                <a:path w="0" h="3815139">
+                <a:path w="0" h="3812069">
                   <a:moveTo>
-                    <a:pt x="0" y="3815139"/>
+                    <a:pt x="0" y="3812069"/>
                   </a:moveTo>
                   <a:lnTo>
                     <a:pt x="0" y="0"/>
@@ -4246,15 +4246,15 @@
           </p:nvSpPr>
           <p:spPr>
             <a:xfrm>
-              <a:off x="5063878" y="1877752"/>
-              <a:ext cx="0" cy="3815139"/>
+              <a:off x="5064916" y="1877752"/>
+              <a:ext cx="0" cy="3812069"/>
             </a:xfrm>
             <a:custGeom>
               <a:avLst/>
               <a:pathLst>
-                <a:path w="0" h="3815139">
+                <a:path w="0" h="3812069">
                   <a:moveTo>
-                    <a:pt x="0" y="3815139"/>
+                    <a:pt x="0" y="3812069"/>
                   </a:moveTo>
                   <a:lnTo>
                     <a:pt x="0" y="0"/>
@@ -4289,15 +4289,15 @@
           </p:nvSpPr>
           <p:spPr>
             <a:xfrm>
-              <a:off x="7602690" y="1877752"/>
-              <a:ext cx="0" cy="3815139"/>
+              <a:off x="7603332" y="1877752"/>
+              <a:ext cx="0" cy="3812069"/>
             </a:xfrm>
             <a:custGeom>
               <a:avLst/>
               <a:pathLst>
-                <a:path w="0" h="3815139">
+                <a:path w="0" h="3812069">
                   <a:moveTo>
-                    <a:pt x="0" y="3815139"/>
+                    <a:pt x="0" y="3812069"/>
                   </a:moveTo>
                   <a:lnTo>
                     <a:pt x="0" y="0"/>
@@ -4332,15 +4332,15 @@
           </p:nvSpPr>
           <p:spPr>
             <a:xfrm>
-              <a:off x="10141502" y="1877752"/>
-              <a:ext cx="0" cy="3815139"/>
+              <a:off x="10141748" y="1877752"/>
+              <a:ext cx="0" cy="3812069"/>
             </a:xfrm>
             <a:custGeom>
               <a:avLst/>
               <a:pathLst>
-                <a:path w="0" h="3815139">
+                <a:path w="0" h="3812069">
                   <a:moveTo>
-                    <a:pt x="0" y="3815139"/>
+                    <a:pt x="0" y="3812069"/>
                   </a:moveTo>
                   <a:lnTo>
                     <a:pt x="0" y="0"/>
@@ -4375,7 +4375,7 @@
           </p:nvSpPr>
           <p:spPr>
             <a:xfrm>
-              <a:off x="4066054" y="3921972"/>
+              <a:off x="4067243" y="3920301"/>
               <a:ext cx="66150" cy="66150"/>
             </a:xfrm>
             <a:prstGeom prst="ellipse">
@@ -4410,7 +4410,7 @@
           </p:nvSpPr>
           <p:spPr>
             <a:xfrm>
-              <a:off x="4713451" y="3921972"/>
+              <a:off x="4714539" y="3920301"/>
               <a:ext cx="66150" cy="66150"/>
             </a:xfrm>
             <a:prstGeom prst="ellipse">
@@ -4445,7 +4445,7 @@
           </p:nvSpPr>
           <p:spPr>
             <a:xfrm>
-              <a:off x="3304410" y="3656314"/>
+              <a:off x="3305718" y="3654857"/>
               <a:ext cx="66150" cy="66150"/>
             </a:xfrm>
             <a:prstGeom prst="ellipse">
@@ -4480,7 +4480,7 @@
           </p:nvSpPr>
           <p:spPr>
             <a:xfrm>
-              <a:off x="5576647" y="3862937"/>
+              <a:off x="5577601" y="3861313"/>
               <a:ext cx="66150" cy="66150"/>
             </a:xfrm>
             <a:prstGeom prst="ellipse">
@@ -4515,7 +4515,7 @@
           </p:nvSpPr>
           <p:spPr>
             <a:xfrm>
-              <a:off x="6147880" y="4261424"/>
+              <a:off x="6148744" y="4259479"/>
               <a:ext cx="66150" cy="66150"/>
             </a:xfrm>
             <a:prstGeom prst="ellipse">
@@ -4550,7 +4550,7 @@
           </p:nvSpPr>
           <p:spPr>
             <a:xfrm>
-              <a:off x="6198656" y="4349976"/>
+              <a:off x="6199512" y="4347960"/>
               <a:ext cx="66150" cy="66150"/>
             </a:xfrm>
             <a:prstGeom prst="ellipse">
@@ -4585,7 +4585,7 @@
           </p:nvSpPr>
           <p:spPr>
             <a:xfrm>
-              <a:off x="6477926" y="4910809"/>
+              <a:off x="6478738" y="4908342"/>
               <a:ext cx="66150" cy="66150"/>
             </a:xfrm>
             <a:prstGeom prst="ellipse">
@@ -4620,7 +4620,7 @@
           </p:nvSpPr>
           <p:spPr>
             <a:xfrm>
-              <a:off x="5513177" y="3420174"/>
+              <a:off x="5514140" y="3418907"/>
               <a:ext cx="66150" cy="66150"/>
             </a:xfrm>
             <a:prstGeom prst="ellipse">
@@ -4655,7 +4655,7 @@
           </p:nvSpPr>
           <p:spPr>
             <a:xfrm>
-              <a:off x="5411625" y="3656314"/>
+              <a:off x="5412604" y="3654857"/>
               <a:ext cx="66150" cy="66150"/>
             </a:xfrm>
             <a:prstGeom prst="ellipse">
@@ -4690,7 +4690,7 @@
           </p:nvSpPr>
           <p:spPr>
             <a:xfrm>
-              <a:off x="6147880" y="4187630"/>
+              <a:off x="6148744" y="4185745"/>
               <a:ext cx="66150" cy="66150"/>
             </a:xfrm>
             <a:prstGeom prst="ellipse">
@@ -4725,7 +4725,7 @@
           </p:nvSpPr>
           <p:spPr>
             <a:xfrm>
-              <a:off x="6147880" y="4394252"/>
+              <a:off x="6148744" y="4392201"/>
               <a:ext cx="66150" cy="66150"/>
             </a:xfrm>
             <a:prstGeom prst="ellipse">
@@ -4760,7 +4760,7 @@
           </p:nvSpPr>
           <p:spPr>
             <a:xfrm>
-              <a:off x="7747332" y="4600875"/>
+              <a:off x="7747946" y="4598657"/>
               <a:ext cx="66150" cy="66150"/>
             </a:xfrm>
             <a:prstGeom prst="ellipse">
@@ -4795,7 +4795,7 @@
           </p:nvSpPr>
           <p:spPr>
             <a:xfrm>
-              <a:off x="6884136" y="4468046"/>
+              <a:off x="6884885" y="4465935"/>
               <a:ext cx="66150" cy="66150"/>
             </a:xfrm>
             <a:prstGeom prst="ellipse">
@@ -4830,7 +4830,7 @@
           </p:nvSpPr>
           <p:spPr>
             <a:xfrm>
-              <a:off x="7011076" y="4777980"/>
+              <a:off x="7011806" y="4775620"/>
               <a:ext cx="66150" cy="66150"/>
             </a:xfrm>
             <a:prstGeom prst="ellipse">
@@ -4865,7 +4865,7 @@
           </p:nvSpPr>
           <p:spPr>
             <a:xfrm>
-              <a:off x="10743130" y="5486401"/>
+              <a:off x="10743277" y="5483471"/>
               <a:ext cx="66150" cy="66150"/>
             </a:xfrm>
             <a:prstGeom prst="ellipse">
@@ -4900,7 +4900,7 @@
           </p:nvSpPr>
           <p:spPr>
             <a:xfrm>
-              <a:off x="11184884" y="5486401"/>
+              <a:off x="11184961" y="5483471"/>
               <a:ext cx="66150" cy="66150"/>
             </a:xfrm>
             <a:prstGeom prst="ellipse">
@@ -4935,7 +4935,7 @@
           </p:nvSpPr>
           <p:spPr>
             <a:xfrm>
-              <a:off x="10984318" y="4851774"/>
+              <a:off x="10984426" y="4849354"/>
               <a:ext cx="66150" cy="66150"/>
             </a:xfrm>
             <a:prstGeom prst="ellipse">
@@ -4970,7 +4970,7 @@
           </p:nvSpPr>
           <p:spPr>
             <a:xfrm>
-              <a:off x="2999753" y="2239473"/>
+              <a:off x="3001108" y="2239156"/>
               <a:ext cx="66150" cy="66150"/>
             </a:xfrm>
             <a:prstGeom prst="ellipse">
@@ -5005,7 +5005,7 @@
           </p:nvSpPr>
           <p:spPr>
             <a:xfrm>
-              <a:off x="1514548" y="2534649"/>
+              <a:off x="1516135" y="2534093"/>
               <a:ext cx="66150" cy="66150"/>
             </a:xfrm>
             <a:prstGeom prst="ellipse">
@@ -5040,7 +5040,7 @@
           </p:nvSpPr>
           <p:spPr>
             <a:xfrm>
-              <a:off x="2073087" y="2018092"/>
+              <a:off x="2074587" y="2017952"/>
               <a:ext cx="66150" cy="66150"/>
             </a:xfrm>
             <a:prstGeom prst="ellipse">
@@ -5075,7 +5075,7 @@
           </p:nvSpPr>
           <p:spPr>
             <a:xfrm>
-              <a:off x="3672538" y="3848178"/>
+              <a:off x="3673789" y="3846566"/>
               <a:ext cx="66150" cy="66150"/>
             </a:xfrm>
             <a:prstGeom prst="ellipse">
@@ -5110,7 +5110,7 @@
           </p:nvSpPr>
           <p:spPr>
             <a:xfrm>
-              <a:off x="6350985" y="4733704"/>
+              <a:off x="6351817" y="4731379"/>
               <a:ext cx="66150" cy="66150"/>
             </a:xfrm>
             <a:prstGeom prst="ellipse">
@@ -5145,7 +5145,7 @@
           </p:nvSpPr>
           <p:spPr>
             <a:xfrm>
-              <a:off x="6135186" y="4777980"/>
+              <a:off x="6136052" y="4775620"/>
               <a:ext cx="66150" cy="66150"/>
             </a:xfrm>
             <a:prstGeom prst="ellipse">
@@ -5180,7 +5180,7 @@
           </p:nvSpPr>
           <p:spPr>
             <a:xfrm>
-              <a:off x="7163405" y="5058397"/>
+              <a:off x="7164110" y="5055811"/>
               <a:ext cx="66150" cy="66150"/>
             </a:xfrm>
             <a:prstGeom prst="ellipse">
@@ -5215,7 +5215,7 @@
           </p:nvSpPr>
           <p:spPr>
             <a:xfrm>
-              <a:off x="7176099" y="4187630"/>
+              <a:off x="7176803" y="4185745"/>
               <a:ext cx="66150" cy="66150"/>
             </a:xfrm>
             <a:prstGeom prst="ellipse">
@@ -5250,7 +5250,7 @@
           </p:nvSpPr>
           <p:spPr>
             <a:xfrm>
-              <a:off x="2326968" y="2992170"/>
+              <a:off x="2328428" y="2991247"/>
               <a:ext cx="66150" cy="66150"/>
             </a:xfrm>
             <a:prstGeom prst="ellipse">
@@ -5285,7 +5285,7 @@
           </p:nvSpPr>
           <p:spPr>
             <a:xfrm>
-              <a:off x="2847424" y="3184034"/>
+              <a:off x="2848804" y="3182956"/>
               <a:ext cx="66150" cy="66150"/>
             </a:xfrm>
             <a:prstGeom prst="ellipse">
@@ -5320,7 +5320,7 @@
           </p:nvSpPr>
           <p:spPr>
             <a:xfrm>
-              <a:off x="1255589" y="2534649"/>
+              <a:off x="1257217" y="2534093"/>
               <a:ext cx="66150" cy="66150"/>
             </a:xfrm>
             <a:prstGeom prst="ellipse">
@@ -5355,7 +5355,7 @@
           </p:nvSpPr>
           <p:spPr>
             <a:xfrm>
-              <a:off x="5462401" y="4689428"/>
+              <a:off x="5463372" y="4687139"/>
               <a:ext cx="66150" cy="66150"/>
             </a:xfrm>
             <a:prstGeom prst="ellipse">
@@ -5390,7 +5390,7 @@
           </p:nvSpPr>
           <p:spPr>
             <a:xfrm>
-              <a:off x="4446876" y="4113836"/>
+              <a:off x="4448006" y="4112010"/>
               <a:ext cx="66150" cy="66150"/>
             </a:xfrm>
             <a:prstGeom prst="ellipse">
@@ -5425,7 +5425,7 @@
           </p:nvSpPr>
           <p:spPr>
             <a:xfrm>
-              <a:off x="6477926" y="4807498"/>
+              <a:off x="6478738" y="4805114"/>
               <a:ext cx="66150" cy="66150"/>
             </a:xfrm>
             <a:prstGeom prst="ellipse">
@@ -5460,7 +5460,7 @@
           </p:nvSpPr>
           <p:spPr>
             <a:xfrm>
-              <a:off x="4472264" y="3862937"/>
+              <a:off x="4473390" y="3861313"/>
               <a:ext cx="66150" cy="66150"/>
             </a:xfrm>
             <a:prstGeom prst="ellipse">
@@ -5495,8 +5495,8 @@
           </p:nvSpPr>
           <p:spPr>
             <a:xfrm>
-              <a:off x="605258" y="5536819"/>
-              <a:ext cx="124311" cy="81691"/>
+              <a:off x="606963" y="5535342"/>
+              <a:ext cx="124311" cy="80272"/>
             </a:xfrm>
             <a:prstGeom prst="rect">
               <a:avLst/>
@@ -5525,8 +5525,8 @@
                       <a:alpha val="100000"/>
                     </a:srgbClr>
                   </a:solidFill>
-                  <a:latin typeface="Arial"/>
-                  <a:cs typeface="Arial"/>
+                  <a:latin typeface="Helvetica"/>
+                  <a:cs typeface="Helvetica"/>
                 </a:rPr>
                 <a:t>10</a:t>
               </a:r>
@@ -5541,8 +5541,8 @@
           </p:nvSpPr>
           <p:spPr>
             <a:xfrm>
-              <a:off x="605258" y="4798881"/>
-              <a:ext cx="124311" cy="81691"/>
+              <a:off x="606963" y="4798489"/>
+              <a:ext cx="124311" cy="79781"/>
             </a:xfrm>
             <a:prstGeom prst="rect">
               <a:avLst/>
@@ -5571,8 +5571,8 @@
                       <a:alpha val="100000"/>
                     </a:srgbClr>
                   </a:solidFill>
-                  <a:latin typeface="Arial"/>
-                  <a:cs typeface="Arial"/>
+                  <a:latin typeface="Helvetica"/>
+                  <a:cs typeface="Helvetica"/>
                 </a:rPr>
                 <a:t>15</a:t>
               </a:r>
@@ -5587,8 +5587,8 @@
           </p:nvSpPr>
           <p:spPr>
             <a:xfrm>
-              <a:off x="605258" y="4060943"/>
-              <a:ext cx="124311" cy="81691"/>
+              <a:off x="606963" y="4060381"/>
+              <a:ext cx="124311" cy="80545"/>
             </a:xfrm>
             <a:prstGeom prst="rect">
               <a:avLst/>
@@ -5617,8 +5617,8 @@
                       <a:alpha val="100000"/>
                     </a:srgbClr>
                   </a:solidFill>
-                  <a:latin typeface="Arial"/>
-                  <a:cs typeface="Arial"/>
+                  <a:latin typeface="Helvetica"/>
+                  <a:cs typeface="Helvetica"/>
                 </a:rPr>
                 <a:t>20</a:t>
               </a:r>
@@ -5633,8 +5633,8 @@
           </p:nvSpPr>
           <p:spPr>
             <a:xfrm>
-              <a:off x="605258" y="3323005"/>
-              <a:ext cx="124311" cy="81691"/>
+              <a:off x="606963" y="3323200"/>
+              <a:ext cx="124311" cy="80382"/>
             </a:xfrm>
             <a:prstGeom prst="rect">
               <a:avLst/>
@@ -5663,8 +5663,8 @@
                       <a:alpha val="100000"/>
                     </a:srgbClr>
                   </a:solidFill>
-                  <a:latin typeface="Arial"/>
-                  <a:cs typeface="Arial"/>
+                  <a:latin typeface="Helvetica"/>
+                  <a:cs typeface="Helvetica"/>
                 </a:rPr>
                 <a:t>25</a:t>
               </a:r>
@@ -5679,8 +5679,8 @@
           </p:nvSpPr>
           <p:spPr>
             <a:xfrm>
-              <a:off x="605258" y="2585012"/>
-              <a:ext cx="124311" cy="81746"/>
+              <a:off x="606963" y="2585856"/>
+              <a:ext cx="124311" cy="80382"/>
             </a:xfrm>
             <a:prstGeom prst="rect">
               <a:avLst/>
@@ -5709,8 +5709,8 @@
                       <a:alpha val="100000"/>
                     </a:srgbClr>
                   </a:solidFill>
-                  <a:latin typeface="Arial"/>
-                  <a:cs typeface="Arial"/>
+                  <a:latin typeface="Helvetica"/>
+                  <a:cs typeface="Helvetica"/>
                 </a:rPr>
                 <a:t>30</a:t>
               </a:r>
@@ -5725,8 +5725,8 @@
           </p:nvSpPr>
           <p:spPr>
             <a:xfrm>
-              <a:off x="605258" y="1847074"/>
-              <a:ext cx="124311" cy="81746"/>
+              <a:off x="606963" y="1848512"/>
+              <a:ext cx="124311" cy="80382"/>
             </a:xfrm>
             <a:prstGeom prst="rect">
               <a:avLst/>
@@ -5755,8 +5755,8 @@
                       <a:alpha val="100000"/>
                     </a:srgbClr>
                   </a:solidFill>
-                  <a:latin typeface="Arial"/>
-                  <a:cs typeface="Arial"/>
+                  <a:latin typeface="Helvetica"/>
+                  <a:cs typeface="Helvetica"/>
                 </a:rPr>
                 <a:t>35</a:t>
               </a:r>
@@ -5771,7 +5771,7 @@
           </p:nvSpPr>
           <p:spPr>
             <a:xfrm>
-              <a:off x="757405" y="5578511"/>
+              <a:off x="759110" y="5575533"/>
               <a:ext cx="34794" cy="0"/>
             </a:xfrm>
             <a:custGeom>
@@ -5811,7 +5811,7 @@
           </p:nvSpPr>
           <p:spPr>
             <a:xfrm>
-              <a:off x="757405" y="4840573"/>
+              <a:off x="759110" y="4838189"/>
               <a:ext cx="34794" cy="0"/>
             </a:xfrm>
             <a:custGeom>
@@ -5851,7 +5851,7 @@
           </p:nvSpPr>
           <p:spPr>
             <a:xfrm>
-              <a:off x="757405" y="4102635"/>
+              <a:off x="759110" y="4100845"/>
               <a:ext cx="34794" cy="0"/>
             </a:xfrm>
             <a:custGeom>
@@ -5891,7 +5891,7 @@
           </p:nvSpPr>
           <p:spPr>
             <a:xfrm>
-              <a:off x="757405" y="3364697"/>
+              <a:off x="759110" y="3363500"/>
               <a:ext cx="34794" cy="0"/>
             </a:xfrm>
             <a:custGeom>
@@ -5931,7 +5931,7 @@
           </p:nvSpPr>
           <p:spPr>
             <a:xfrm>
-              <a:off x="757405" y="2626759"/>
+              <a:off x="759110" y="2626156"/>
               <a:ext cx="34794" cy="0"/>
             </a:xfrm>
             <a:custGeom>
@@ -5971,7 +5971,7 @@
           </p:nvSpPr>
           <p:spPr>
             <a:xfrm>
-              <a:off x="757405" y="1888821"/>
+              <a:off x="759110" y="1888812"/>
               <a:ext cx="34794" cy="0"/>
             </a:xfrm>
             <a:custGeom>
@@ -6011,7 +6011,7 @@
           </p:nvSpPr>
           <p:spPr>
             <a:xfrm>
-              <a:off x="2525066" y="5692891"/>
+              <a:off x="2526500" y="5689821"/>
               <a:ext cx="0" cy="34794"/>
             </a:xfrm>
             <a:custGeom>
@@ -6051,7 +6051,7 @@
           </p:nvSpPr>
           <p:spPr>
             <a:xfrm>
-              <a:off x="5063878" y="5692891"/>
+              <a:off x="5064916" y="5689821"/>
               <a:ext cx="0" cy="34794"/>
             </a:xfrm>
             <a:custGeom>
@@ -6091,7 +6091,7 @@
           </p:nvSpPr>
           <p:spPr>
             <a:xfrm>
-              <a:off x="7602690" y="5692891"/>
+              <a:off x="7603332" y="5689821"/>
               <a:ext cx="0" cy="34794"/>
             </a:xfrm>
             <a:custGeom>
@@ -6131,7 +6131,7 @@
           </p:nvSpPr>
           <p:spPr>
             <a:xfrm>
-              <a:off x="10141502" y="5692891"/>
+              <a:off x="10141748" y="5689821"/>
               <a:ext cx="0" cy="34794"/>
             </a:xfrm>
             <a:custGeom>
@@ -6171,8 +6171,8 @@
           </p:nvSpPr>
           <p:spPr>
             <a:xfrm>
-              <a:off x="2493988" y="5755194"/>
-              <a:ext cx="62155" cy="80327"/>
+              <a:off x="2495423" y="5754198"/>
+              <a:ext cx="62155" cy="78417"/>
             </a:xfrm>
             <a:prstGeom prst="rect">
               <a:avLst/>
@@ -6201,8 +6201,8 @@
                       <a:alpha val="100000"/>
                     </a:srgbClr>
                   </a:solidFill>
-                  <a:latin typeface="Arial"/>
-                  <a:cs typeface="Arial"/>
+                  <a:latin typeface="Helvetica"/>
+                  <a:cs typeface="Helvetica"/>
                 </a:rPr>
                 <a:t>2</a:t>
               </a:r>
@@ -6217,8 +6217,8 @@
           </p:nvSpPr>
           <p:spPr>
             <a:xfrm>
-              <a:off x="5032800" y="5753775"/>
-              <a:ext cx="62155" cy="81746"/>
+              <a:off x="5033838" y="5752233"/>
+              <a:ext cx="62155" cy="80382"/>
             </a:xfrm>
             <a:prstGeom prst="rect">
               <a:avLst/>
@@ -6247,8 +6247,8 @@
                       <a:alpha val="100000"/>
                     </a:srgbClr>
                   </a:solidFill>
-                  <a:latin typeface="Arial"/>
-                  <a:cs typeface="Arial"/>
+                  <a:latin typeface="Helvetica"/>
+                  <a:cs typeface="Helvetica"/>
                 </a:rPr>
                 <a:t>3</a:t>
               </a:r>
@@ -6263,8 +6263,8 @@
           </p:nvSpPr>
           <p:spPr>
             <a:xfrm>
-              <a:off x="7571612" y="5755521"/>
-              <a:ext cx="62155" cy="80000"/>
+              <a:off x="7572254" y="5754252"/>
+              <a:ext cx="62155" cy="78362"/>
             </a:xfrm>
             <a:prstGeom prst="rect">
               <a:avLst/>
@@ -6293,8 +6293,8 @@
                       <a:alpha val="100000"/>
                     </a:srgbClr>
                   </a:solidFill>
-                  <a:latin typeface="Arial"/>
-                  <a:cs typeface="Arial"/>
+                  <a:latin typeface="Helvetica"/>
+                  <a:cs typeface="Helvetica"/>
                 </a:rPr>
                 <a:t>4</a:t>
               </a:r>
@@ -6309,8 +6309,8 @@
           </p:nvSpPr>
           <p:spPr>
             <a:xfrm>
-              <a:off x="10110425" y="5755248"/>
-              <a:ext cx="62155" cy="80272"/>
+              <a:off x="10110670" y="5753816"/>
+              <a:ext cx="62155" cy="78799"/>
             </a:xfrm>
             <a:prstGeom prst="rect">
               <a:avLst/>
@@ -6339,8 +6339,8 @@
                       <a:alpha val="100000"/>
                     </a:srgbClr>
                   </a:solidFill>
-                  <a:latin typeface="Arial"/>
-                  <a:cs typeface="Arial"/>
+                  <a:latin typeface="Helvetica"/>
+                  <a:cs typeface="Helvetica"/>
                 </a:rPr>
                 <a:t>5</a:t>
               </a:r>
@@ -6355,8 +6355,8 @@
           </p:nvSpPr>
           <p:spPr>
             <a:xfrm>
-              <a:off x="6183461" y="5895132"/>
-              <a:ext cx="139700" cy="98704"/>
+              <a:off x="6184314" y="5897724"/>
+              <a:ext cx="139700" cy="94611"/>
             </a:xfrm>
             <a:prstGeom prst="rect">
               <a:avLst/>
@@ -6385,8 +6385,8 @@
                       <a:alpha val="100000"/>
                     </a:srgbClr>
                   </a:solidFill>
-                  <a:latin typeface="Arial"/>
-                  <a:cs typeface="Arial"/>
+                  <a:latin typeface="Helvetica"/>
+                  <a:cs typeface="Helvetica"/>
                 </a:rPr>
                 <a:t>wt</a:t>
               </a:r>
@@ -6401,8 +6401,8 @@
           </p:nvSpPr>
           <p:spPr>
             <a:xfrm rot="-5400000">
-              <a:off x="353444" y="3733582"/>
-              <a:ext cx="271760" cy="103478"/>
+              <a:off x="352523" y="3730922"/>
+              <a:ext cx="271760" cy="105729"/>
             </a:xfrm>
             <a:prstGeom prst="rect">
               <a:avLst/>
@@ -6431,8 +6431,8 @@
                       <a:alpha val="100000"/>
                     </a:srgbClr>
                   </a:solidFill>
-                  <a:latin typeface="Arial"/>
-                  <a:cs typeface="Arial"/>
+                  <a:latin typeface="Helvetica"/>
+                  <a:cs typeface="Helvetica"/>
                 </a:rPr>
                 <a:t>mpg</a:t>
               </a:r>
@@ -6570,7 +6570,7 @@
           <p:spPr>
             <a:xfrm>
               <a:off x="371475" y="1808162"/>
-              <a:ext cx="11412538" cy="4284662"/>
+              <a:ext cx="11412537" cy="4284662"/>
             </a:xfrm>
             <a:prstGeom prst="rect">
               <a:avLst/>
@@ -6595,8 +6595,8 @@
           </p:nvSpPr>
           <p:spPr>
             <a:xfrm>
-              <a:off x="602925" y="1899602"/>
-              <a:ext cx="11071359" cy="3561655"/>
+              <a:off x="591538" y="1899602"/>
+              <a:ext cx="11082746" cy="3556074"/>
             </a:xfrm>
             <a:prstGeom prst="rect">
               <a:avLst/>
@@ -6621,21 +6621,21 @@
           </p:nvSpPr>
           <p:spPr>
             <a:xfrm>
-              <a:off x="602925" y="4896183"/>
-              <a:ext cx="11071359" cy="0"/>
+              <a:off x="591538" y="4891487"/>
+              <a:ext cx="11082746" cy="0"/>
             </a:xfrm>
             <a:custGeom>
               <a:avLst/>
               <a:pathLst>
-                <a:path w="11071359" h="0">
+                <a:path w="11082746" h="0">
                   <a:moveTo>
                     <a:pt x="0" y="0"/>
                   </a:moveTo>
                   <a:lnTo>
-                    <a:pt x="11071359" y="0"/>
+                    <a:pt x="11082746" y="0"/>
                   </a:lnTo>
                   <a:lnTo>
-                    <a:pt x="11071359" y="0"/>
+                    <a:pt x="11082746" y="0"/>
                   </a:lnTo>
                 </a:path>
               </a:pathLst>
@@ -6664,21 +6664,21 @@
           </p:nvSpPr>
           <p:spPr>
             <a:xfrm>
-              <a:off x="602925" y="4068295"/>
-              <a:ext cx="11071359" cy="0"/>
+              <a:off x="591538" y="4064897"/>
+              <a:ext cx="11082746" cy="0"/>
             </a:xfrm>
             <a:custGeom>
               <a:avLst/>
               <a:pathLst>
-                <a:path w="11071359" h="0">
+                <a:path w="11082746" h="0">
                   <a:moveTo>
                     <a:pt x="0" y="0"/>
                   </a:moveTo>
                   <a:lnTo>
-                    <a:pt x="11071359" y="0"/>
+                    <a:pt x="11082746" y="0"/>
                   </a:lnTo>
                   <a:lnTo>
-                    <a:pt x="11071359" y="0"/>
+                    <a:pt x="11082746" y="0"/>
                   </a:lnTo>
                 </a:path>
               </a:pathLst>
@@ -6707,21 +6707,21 @@
           </p:nvSpPr>
           <p:spPr>
             <a:xfrm>
-              <a:off x="602925" y="3240408"/>
-              <a:ext cx="11071359" cy="0"/>
+              <a:off x="591538" y="3238307"/>
+              <a:ext cx="11082746" cy="0"/>
             </a:xfrm>
             <a:custGeom>
               <a:avLst/>
               <a:pathLst>
-                <a:path w="11071359" h="0">
+                <a:path w="11082746" h="0">
                   <a:moveTo>
                     <a:pt x="0" y="0"/>
                   </a:moveTo>
                   <a:lnTo>
-                    <a:pt x="11071359" y="0"/>
+                    <a:pt x="11082746" y="0"/>
                   </a:lnTo>
                   <a:lnTo>
-                    <a:pt x="11071359" y="0"/>
+                    <a:pt x="11082746" y="0"/>
                   </a:lnTo>
                 </a:path>
               </a:pathLst>
@@ -6750,21 +6750,21 @@
           </p:nvSpPr>
           <p:spPr>
             <a:xfrm>
-              <a:off x="602925" y="2412520"/>
-              <a:ext cx="11071359" cy="0"/>
+              <a:off x="591538" y="2411717"/>
+              <a:ext cx="11082746" cy="0"/>
             </a:xfrm>
             <a:custGeom>
               <a:avLst/>
               <a:pathLst>
-                <a:path w="11071359" h="0">
+                <a:path w="11082746" h="0">
                   <a:moveTo>
                     <a:pt x="0" y="0"/>
                   </a:moveTo>
                   <a:lnTo>
-                    <a:pt x="11071359" y="0"/>
+                    <a:pt x="11082746" y="0"/>
                   </a:lnTo>
                   <a:lnTo>
-                    <a:pt x="11071359" y="0"/>
+                    <a:pt x="11082746" y="0"/>
                   </a:lnTo>
                 </a:path>
               </a:pathLst>
@@ -6793,7 +6793,7 @@
           </p:nvSpPr>
           <p:spPr>
             <a:xfrm>
-              <a:off x="5612994" y="4349818"/>
+              <a:off x="5606793" y="4345926"/>
               <a:ext cx="66150" cy="66150"/>
             </a:xfrm>
             <a:prstGeom prst="ellipse">
@@ -6828,7 +6828,7 @@
           </p:nvSpPr>
           <p:spPr>
             <a:xfrm>
-              <a:off x="5612994" y="4138706"/>
+              <a:off x="5606793" y="4135146"/>
               <a:ext cx="66150" cy="66150"/>
             </a:xfrm>
             <a:prstGeom prst="ellipse">
@@ -6863,7 +6863,7 @@
           </p:nvSpPr>
           <p:spPr>
             <a:xfrm>
-              <a:off x="6383920" y="4598184"/>
+              <a:off x="6378513" y="4593904"/>
               <a:ext cx="66150" cy="66150"/>
             </a:xfrm>
             <a:prstGeom prst="ellipse">
@@ -6898,7 +6898,7 @@
           </p:nvSpPr>
           <p:spPr>
             <a:xfrm>
-              <a:off x="5784311" y="3857225"/>
+              <a:off x="5778287" y="3854105"/>
               <a:ext cx="66150" cy="66150"/>
             </a:xfrm>
             <a:prstGeom prst="ellipse">
@@ -6933,7 +6933,7 @@
           </p:nvSpPr>
           <p:spPr>
             <a:xfrm>
-              <a:off x="4627921" y="3670950"/>
+              <a:off x="4620708" y="3668122"/>
               <a:ext cx="66150" cy="66150"/>
             </a:xfrm>
             <a:prstGeom prst="ellipse">
@@ -6968,7 +6968,7 @@
           </p:nvSpPr>
           <p:spPr>
             <a:xfrm>
-              <a:off x="4370946" y="3654392"/>
+              <a:off x="4363468" y="3651591"/>
               <a:ext cx="66150" cy="66150"/>
             </a:xfrm>
             <a:prstGeom prst="ellipse">
@@ -7003,7 +7003,7 @@
           </p:nvSpPr>
           <p:spPr>
             <a:xfrm>
-              <a:off x="2743434" y="3563325"/>
+              <a:off x="2734283" y="3560666"/>
               <a:ext cx="66150" cy="66150"/>
             </a:xfrm>
             <a:prstGeom prst="ellipse">
@@ -7038,7 +7038,7 @@
           </p:nvSpPr>
           <p:spPr>
             <a:xfrm>
-              <a:off x="7069188" y="3877922"/>
+              <a:off x="7064485" y="3874770"/>
               <a:ext cx="66150" cy="66150"/>
             </a:xfrm>
             <a:prstGeom prst="ellipse">
@@ -7073,7 +7073,7 @@
           </p:nvSpPr>
           <p:spPr>
             <a:xfrm>
-              <a:off x="6383920" y="3911037"/>
+              <a:off x="6378513" y="3907834"/>
               <a:ext cx="66150" cy="66150"/>
             </a:xfrm>
             <a:prstGeom prst="ellipse">
@@ -7108,7 +7108,7 @@
           </p:nvSpPr>
           <p:spPr>
             <a:xfrm>
-              <a:off x="4842067" y="3670950"/>
+              <a:off x="4835074" y="3668122"/>
               <a:ext cx="66150" cy="66150"/>
             </a:xfrm>
             <a:prstGeom prst="ellipse">
@@ -7143,7 +7143,7 @@
           </p:nvSpPr>
           <p:spPr>
             <a:xfrm>
-              <a:off x="4242458" y="3670950"/>
+              <a:off x="4234848" y="3668122"/>
               <a:ext cx="66150" cy="66150"/>
             </a:xfrm>
             <a:prstGeom prst="ellipse">
@@ -7178,7 +7178,7 @@
           </p:nvSpPr>
           <p:spPr>
             <a:xfrm>
-              <a:off x="3642849" y="3149381"/>
+              <a:off x="3634622" y="3147371"/>
               <a:ext cx="66150" cy="66150"/>
             </a:xfrm>
             <a:prstGeom prst="ellipse">
@@ -7213,7 +7213,7 @@
           </p:nvSpPr>
           <p:spPr>
             <a:xfrm>
-              <a:off x="4028312" y="3430863"/>
+              <a:off x="4020482" y="3428411"/>
               <a:ext cx="66150" cy="66150"/>
             </a:xfrm>
             <a:prstGeom prst="ellipse">
@@ -7248,7 +7248,7 @@
           </p:nvSpPr>
           <p:spPr>
             <a:xfrm>
-              <a:off x="3128898" y="3389468"/>
+              <a:off x="3120142" y="3387082"/>
               <a:ext cx="66150" cy="66150"/>
             </a:xfrm>
             <a:prstGeom prst="ellipse">
@@ -7283,7 +7283,7 @@
           </p:nvSpPr>
           <p:spPr>
             <a:xfrm>
-              <a:off x="1073094" y="2172473"/>
+              <a:off x="1062224" y="2171994"/>
               <a:ext cx="66150" cy="66150"/>
             </a:xfrm>
             <a:prstGeom prst="ellipse">
@@ -7318,7 +7318,7 @@
           </p:nvSpPr>
           <p:spPr>
             <a:xfrm>
-              <a:off x="1073094" y="2028421"/>
+              <a:off x="1062224" y="2028167"/>
               <a:ext cx="66150" cy="66150"/>
             </a:xfrm>
             <a:prstGeom prst="ellipse">
@@ -7353,7 +7353,7 @@
           </p:nvSpPr>
           <p:spPr>
             <a:xfrm>
-              <a:off x="2914751" y="2093824"/>
+              <a:off x="2905776" y="2093468"/>
               <a:ext cx="66150" cy="66150"/>
             </a:xfrm>
             <a:prstGeom prst="ellipse">
@@ -7388,7 +7388,7 @@
           </p:nvSpPr>
           <p:spPr>
             <a:xfrm>
-              <a:off x="10495527" y="4697531"/>
+              <a:off x="10494349" y="4693094"/>
               <a:ext cx="66150" cy="66150"/>
             </a:xfrm>
             <a:prstGeom prst="ellipse">
@@ -7423,7 +7423,7 @@
           </p:nvSpPr>
           <p:spPr>
             <a:xfrm>
-              <a:off x="9638942" y="5181845"/>
+              <a:off x="9636883" y="5176650"/>
               <a:ext cx="66150" cy="66150"/>
             </a:xfrm>
             <a:prstGeom prst="ellipse">
@@ -7458,7 +7458,7 @@
           </p:nvSpPr>
           <p:spPr>
             <a:xfrm>
-              <a:off x="11137966" y="4999710"/>
+              <a:off x="11137448" y="4994800"/>
               <a:ext cx="66150" cy="66150"/>
             </a:xfrm>
             <a:prstGeom prst="ellipse">
@@ -7493,7 +7493,7 @@
           </p:nvSpPr>
           <p:spPr>
             <a:xfrm>
-              <a:off x="5827140" y="4478140"/>
+              <a:off x="5821160" y="4474048"/>
               <a:ext cx="66150" cy="66150"/>
             </a:xfrm>
             <a:prstGeom prst="ellipse">
@@ -7528,7 +7528,7 @@
           </p:nvSpPr>
           <p:spPr>
             <a:xfrm>
-              <a:off x="3257385" y="3604719"/>
+              <a:off x="3248762" y="3601995"/>
               <a:ext cx="66150" cy="66150"/>
             </a:xfrm>
             <a:prstGeom prst="ellipse">
@@ -7563,7 +7563,7 @@
           </p:nvSpPr>
           <p:spPr>
             <a:xfrm>
-              <a:off x="3128898" y="3675089"/>
+              <a:off x="3120142" y="3672255"/>
               <a:ext cx="66150" cy="66150"/>
             </a:xfrm>
             <a:prstGeom prst="ellipse">
@@ -7598,7 +7598,7 @@
           </p:nvSpPr>
           <p:spPr>
             <a:xfrm>
-              <a:off x="2315142" y="3339795"/>
+              <a:off x="2305550" y="3337486"/>
               <a:ext cx="66150" cy="66150"/>
             </a:xfrm>
             <a:prstGeom prst="ellipse">
@@ -7633,7 +7633,7 @@
           </p:nvSpPr>
           <p:spPr>
             <a:xfrm>
-              <a:off x="4842067" y="3335655"/>
+              <a:off x="4835074" y="3333353"/>
               <a:ext cx="66150" cy="66150"/>
             </a:xfrm>
             <a:prstGeom prst="ellipse">
@@ -7668,7 +7668,7 @@
           </p:nvSpPr>
           <p:spPr>
             <a:xfrm>
-              <a:off x="8311236" y="4916921"/>
+              <a:off x="8307811" y="4912141"/>
               <a:ext cx="66150" cy="66150"/>
             </a:xfrm>
             <a:prstGeom prst="ellipse">
@@ -7703,7 +7703,7 @@
           </p:nvSpPr>
           <p:spPr>
             <a:xfrm>
-              <a:off x="7754456" y="4747204"/>
+              <a:off x="7750458" y="4742690"/>
               <a:ext cx="66150" cy="66150"/>
             </a:xfrm>
             <a:prstGeom prst="ellipse">
@@ -7738,7 +7738,7 @@
           </p:nvSpPr>
           <p:spPr>
             <a:xfrm>
-              <a:off x="9638942" y="5266289"/>
+              <a:off x="9636883" y="5260962"/>
               <a:ext cx="66150" cy="66150"/>
             </a:xfrm>
             <a:prstGeom prst="ellipse">
@@ -7773,7 +7773,7 @@
           </p:nvSpPr>
           <p:spPr>
             <a:xfrm>
-              <a:off x="3385873" y="3894480"/>
+              <a:off x="3377382" y="3891302"/>
               <a:ext cx="66150" cy="66150"/>
             </a:xfrm>
             <a:prstGeom prst="ellipse">
@@ -7808,7 +7808,7 @@
           </p:nvSpPr>
           <p:spPr>
             <a:xfrm>
-              <a:off x="5056214" y="4225635"/>
+              <a:off x="5049441" y="4221938"/>
               <a:ext cx="66150" cy="66150"/>
             </a:xfrm>
             <a:prstGeom prst="ellipse">
@@ -7843,7 +7843,7 @@
           </p:nvSpPr>
           <p:spPr>
             <a:xfrm>
-              <a:off x="3043239" y="3563325"/>
+              <a:off x="3034396" y="3560666"/>
               <a:ext cx="66150" cy="66150"/>
             </a:xfrm>
             <a:prstGeom prst="ellipse">
@@ -7878,7 +7878,7 @@
           </p:nvSpPr>
           <p:spPr>
             <a:xfrm>
-              <a:off x="5784311" y="4217356"/>
+              <a:off x="5778287" y="4213672"/>
               <a:ext cx="66150" cy="66150"/>
             </a:xfrm>
             <a:prstGeom prst="ellipse">
@@ -7913,8 +7913,8 @@
           </p:nvSpPr>
           <p:spPr>
             <a:xfrm>
-              <a:off x="373303" y="4813695"/>
-              <a:ext cx="127136" cy="164306"/>
+              <a:off x="373303" y="4813074"/>
+              <a:ext cx="127136" cy="160399"/>
             </a:xfrm>
             <a:prstGeom prst="rect">
               <a:avLst/>
@@ -7943,8 +7943,8 @@
                       <a:alpha val="100000"/>
                     </a:srgbClr>
                   </a:solidFill>
-                  <a:latin typeface="Arial"/>
-                  <a:cs typeface="Arial"/>
+                  <a:latin typeface="Helvetica"/>
+                  <a:cs typeface="Helvetica"/>
                 </a:rPr>
                 <a:t>2</a:t>
               </a:r>
@@ -7959,8 +7959,8 @@
           </p:nvSpPr>
           <p:spPr>
             <a:xfrm>
-              <a:off x="373303" y="3982905"/>
-              <a:ext cx="127136" cy="167208"/>
+              <a:off x="373303" y="3982465"/>
+              <a:ext cx="127136" cy="164417"/>
             </a:xfrm>
             <a:prstGeom prst="rect">
               <a:avLst/>
@@ -7989,8 +7989,8 @@
                       <a:alpha val="100000"/>
                     </a:srgbClr>
                   </a:solidFill>
-                  <a:latin typeface="Arial"/>
-                  <a:cs typeface="Arial"/>
+                  <a:latin typeface="Helvetica"/>
+                  <a:cs typeface="Helvetica"/>
                 </a:rPr>
                 <a:t>3</a:t>
               </a:r>
@@ -8005,8 +8005,8 @@
           </p:nvSpPr>
           <p:spPr>
             <a:xfrm>
-              <a:off x="373303" y="3158590"/>
-              <a:ext cx="127136" cy="163636"/>
+              <a:off x="373303" y="3160005"/>
+              <a:ext cx="127136" cy="160287"/>
             </a:xfrm>
             <a:prstGeom prst="rect">
               <a:avLst/>
@@ -8035,8 +8035,8 @@
                       <a:alpha val="100000"/>
                     </a:srgbClr>
                   </a:solidFill>
-                  <a:latin typeface="Arial"/>
-                  <a:cs typeface="Arial"/>
+                  <a:latin typeface="Helvetica"/>
+                  <a:cs typeface="Helvetica"/>
                 </a:rPr>
                 <a:t>4</a:t>
               </a:r>
@@ -8051,8 +8051,8 @@
           </p:nvSpPr>
           <p:spPr>
             <a:xfrm>
-              <a:off x="373303" y="2330144"/>
-              <a:ext cx="127136" cy="164194"/>
+              <a:off x="373303" y="2332521"/>
+              <a:ext cx="127136" cy="161180"/>
             </a:xfrm>
             <a:prstGeom prst="rect">
               <a:avLst/>
@@ -8081,8 +8081,8 @@
                       <a:alpha val="100000"/>
                     </a:srgbClr>
                   </a:solidFill>
-                  <a:latin typeface="Arial"/>
-                  <a:cs typeface="Arial"/>
+                  <a:latin typeface="Helvetica"/>
+                  <a:cs typeface="Helvetica"/>
                 </a:rPr>
                 <a:t>5</a:t>
               </a:r>
@@ -8097,18 +8097,18 @@
           </p:nvSpPr>
           <p:spPr>
             <a:xfrm>
-              <a:off x="602925" y="5461258"/>
-              <a:ext cx="11071359" cy="0"/>
+              <a:off x="591538" y="5455677"/>
+              <a:ext cx="11082746" cy="0"/>
             </a:xfrm>
             <a:custGeom>
               <a:avLst/>
               <a:pathLst>
-                <a:path w="11071359" h="0">
+                <a:path w="11082746" h="0">
                   <a:moveTo>
                     <a:pt x="0" y="0"/>
                   </a:moveTo>
                   <a:lnTo>
-                    <a:pt x="11071359" y="0"/>
+                    <a:pt x="11082746" y="0"/>
                   </a:lnTo>
                 </a:path>
               </a:pathLst>
@@ -8137,7 +8137,7 @@
           </p:nvSpPr>
           <p:spPr>
             <a:xfrm>
-              <a:off x="934852" y="5461258"/>
+              <a:off x="923806" y="5455677"/>
               <a:ext cx="0" cy="56936"/>
             </a:xfrm>
             <a:custGeom>
@@ -8177,7 +8177,7 @@
           </p:nvSpPr>
           <p:spPr>
             <a:xfrm>
-              <a:off x="3076314" y="5461258"/>
+              <a:off x="3067471" y="5455677"/>
               <a:ext cx="0" cy="56936"/>
             </a:xfrm>
             <a:custGeom>
@@ -8217,7 +8217,7 @@
           </p:nvSpPr>
           <p:spPr>
             <a:xfrm>
-              <a:off x="5217776" y="5461258"/>
+              <a:off x="5211135" y="5455677"/>
               <a:ext cx="0" cy="56936"/>
             </a:xfrm>
             <a:custGeom>
@@ -8257,7 +8257,7 @@
           </p:nvSpPr>
           <p:spPr>
             <a:xfrm>
-              <a:off x="7359238" y="5461258"/>
+              <a:off x="7354800" y="5455677"/>
               <a:ext cx="0" cy="56936"/>
             </a:xfrm>
             <a:custGeom>
@@ -8297,7 +8297,7 @@
           </p:nvSpPr>
           <p:spPr>
             <a:xfrm>
-              <a:off x="9500700" y="5461258"/>
+              <a:off x="9498465" y="5455677"/>
               <a:ext cx="0" cy="56936"/>
             </a:xfrm>
             <a:custGeom>
@@ -8337,7 +8337,7 @@
           </p:nvSpPr>
           <p:spPr>
             <a:xfrm>
-              <a:off x="11642163" y="5461258"/>
+              <a:off x="11642130" y="5455677"/>
               <a:ext cx="0" cy="56936"/>
             </a:xfrm>
             <a:custGeom>
@@ -8377,8 +8377,8 @@
           </p:nvSpPr>
           <p:spPr>
             <a:xfrm>
-              <a:off x="807716" y="5590649"/>
-              <a:ext cx="254272" cy="167096"/>
+              <a:off x="796670" y="5588305"/>
+              <a:ext cx="254272" cy="164194"/>
             </a:xfrm>
             <a:prstGeom prst="rect">
               <a:avLst/>
@@ -8407,8 +8407,8 @@
                       <a:alpha val="100000"/>
                     </a:srgbClr>
                   </a:solidFill>
-                  <a:latin typeface="Arial"/>
-                  <a:cs typeface="Arial"/>
+                  <a:latin typeface="Helvetica"/>
+                  <a:cs typeface="Helvetica"/>
                 </a:rPr>
                 <a:t>10</a:t>
               </a:r>
@@ -8423,8 +8423,8 @@
           </p:nvSpPr>
           <p:spPr>
             <a:xfrm>
-              <a:off x="2949178" y="5590649"/>
-              <a:ext cx="254272" cy="167096"/>
+              <a:off x="2940334" y="5589310"/>
+              <a:ext cx="254272" cy="163190"/>
             </a:xfrm>
             <a:prstGeom prst="rect">
               <a:avLst/>
@@ -8453,8 +8453,8 @@
                       <a:alpha val="100000"/>
                     </a:srgbClr>
                   </a:solidFill>
-                  <a:latin typeface="Arial"/>
-                  <a:cs typeface="Arial"/>
+                  <a:latin typeface="Helvetica"/>
+                  <a:cs typeface="Helvetica"/>
                 </a:rPr>
                 <a:t>15</a:t>
               </a:r>
@@ -8469,8 +8469,8 @@
           </p:nvSpPr>
           <p:spPr>
             <a:xfrm>
-              <a:off x="5090640" y="5590649"/>
-              <a:ext cx="254272" cy="167096"/>
+              <a:off x="5083999" y="5587747"/>
+              <a:ext cx="254272" cy="164752"/>
             </a:xfrm>
             <a:prstGeom prst="rect">
               <a:avLst/>
@@ -8499,8 +8499,8 @@
                       <a:alpha val="100000"/>
                     </a:srgbClr>
                   </a:solidFill>
-                  <a:latin typeface="Arial"/>
-                  <a:cs typeface="Arial"/>
+                  <a:latin typeface="Helvetica"/>
+                  <a:cs typeface="Helvetica"/>
                 </a:rPr>
                 <a:t>20</a:t>
               </a:r>
@@ -8515,8 +8515,8 @@
           </p:nvSpPr>
           <p:spPr>
             <a:xfrm>
-              <a:off x="7232102" y="5590649"/>
-              <a:ext cx="254272" cy="167096"/>
+              <a:off x="7227664" y="5588082"/>
+              <a:ext cx="254272" cy="164417"/>
             </a:xfrm>
             <a:prstGeom prst="rect">
               <a:avLst/>
@@ -8545,8 +8545,8 @@
                       <a:alpha val="100000"/>
                     </a:srgbClr>
                   </a:solidFill>
-                  <a:latin typeface="Arial"/>
-                  <a:cs typeface="Arial"/>
+                  <a:latin typeface="Helvetica"/>
+                  <a:cs typeface="Helvetica"/>
                 </a:rPr>
                 <a:t>25</a:t>
               </a:r>
@@ -8561,8 +8561,8 @@
           </p:nvSpPr>
           <p:spPr>
             <a:xfrm>
-              <a:off x="9373564" y="5590538"/>
-              <a:ext cx="254272" cy="167208"/>
+              <a:off x="9371328" y="5588082"/>
+              <a:ext cx="254272" cy="164417"/>
             </a:xfrm>
             <a:prstGeom prst="rect">
               <a:avLst/>
@@ -8591,8 +8591,8 @@
                       <a:alpha val="100000"/>
                     </a:srgbClr>
                   </a:solidFill>
-                  <a:latin typeface="Arial"/>
-                  <a:cs typeface="Arial"/>
+                  <a:latin typeface="Helvetica"/>
+                  <a:cs typeface="Helvetica"/>
                 </a:rPr>
                 <a:t>30</a:t>
               </a:r>
@@ -8607,8 +8607,8 @@
           </p:nvSpPr>
           <p:spPr>
             <a:xfrm>
-              <a:off x="11515026" y="5590538"/>
-              <a:ext cx="254272" cy="167208"/>
+              <a:off x="11514993" y="5588082"/>
+              <a:ext cx="254272" cy="164417"/>
             </a:xfrm>
             <a:prstGeom prst="rect">
               <a:avLst/>
@@ -8637,8 +8637,8 @@
                       <a:alpha val="100000"/>
                     </a:srgbClr>
                   </a:solidFill>
-                  <a:latin typeface="Arial"/>
-                  <a:cs typeface="Arial"/>
+                  <a:latin typeface="Helvetica"/>
+                  <a:cs typeface="Helvetica"/>
                 </a:rPr>
                 <a:t>35</a:t>
               </a:r>
@@ -8653,8 +8653,8 @@
           </p:nvSpPr>
           <p:spPr>
             <a:xfrm>
-              <a:off x="5916256" y="5857099"/>
-              <a:ext cx="444698" cy="169329"/>
+              <a:off x="5910562" y="5850959"/>
+              <a:ext cx="444698" cy="173012"/>
             </a:xfrm>
             <a:prstGeom prst="rect">
               <a:avLst/>
@@ -8683,8 +8683,8 @@
                       <a:alpha val="100000"/>
                     </a:srgbClr>
                   </a:solidFill>
-                  <a:latin typeface="Arial"/>
-                  <a:cs typeface="Arial"/>
+                  <a:latin typeface="Helvetica"/>
+                  <a:cs typeface="Helvetica"/>
                 </a:rPr>
                 <a:t>mpg</a:t>
               </a:r>

</xml_diff>

<commit_message>
Deprecate several chart types
Deprecate unused 'tiny', 'a4' and 'normal_169' chart types. Update tests to ensure they work given this change. Update grattan_label so it uses updated 'linewidth' parameter.
</commit_message>
<xml_diff>
--- a/tests/testthat/multi_slide_fullslide.pptx
+++ b/tests/testthat/multi_slide_fullslide.pptx
@@ -3489,8 +3489,8 @@
           </p:nvSpPr>
           <p:spPr>
             <a:xfrm>
-              <a:off x="793905" y="1877752"/>
-              <a:ext cx="10920518" cy="3812069"/>
+              <a:off x="793972" y="1877752"/>
+              <a:ext cx="10920451" cy="3812052"/>
             </a:xfrm>
             <a:prstGeom prst="rect">
               <a:avLst/>
@@ -3515,21 +3515,21 @@
           </p:nvSpPr>
           <p:spPr>
             <a:xfrm>
-              <a:off x="793905" y="5206861"/>
-              <a:ext cx="10920518" cy="0"/>
+              <a:off x="793972" y="5206846"/>
+              <a:ext cx="10920451" cy="0"/>
             </a:xfrm>
             <a:custGeom>
               <a:avLst/>
               <a:pathLst>
-                <a:path w="10920518" h="0">
+                <a:path w="10920451" h="0">
                   <a:moveTo>
                     <a:pt x="0" y="0"/>
                   </a:moveTo>
                   <a:lnTo>
-                    <a:pt x="10920518" y="0"/>
+                    <a:pt x="10920451" y="0"/>
                   </a:lnTo>
                   <a:lnTo>
-                    <a:pt x="10920518" y="0"/>
+                    <a:pt x="10920451" y="0"/>
                   </a:lnTo>
                 </a:path>
               </a:pathLst>
@@ -3558,21 +3558,21 @@
           </p:nvSpPr>
           <p:spPr>
             <a:xfrm>
-              <a:off x="793905" y="4469517"/>
-              <a:ext cx="10920518" cy="0"/>
+              <a:off x="793972" y="4469505"/>
+              <a:ext cx="10920451" cy="0"/>
             </a:xfrm>
             <a:custGeom>
               <a:avLst/>
               <a:pathLst>
-                <a:path w="10920518" h="0">
+                <a:path w="10920451" h="0">
                   <a:moveTo>
                     <a:pt x="0" y="0"/>
                   </a:moveTo>
                   <a:lnTo>
-                    <a:pt x="10920518" y="0"/>
+                    <a:pt x="10920451" y="0"/>
                   </a:lnTo>
                   <a:lnTo>
-                    <a:pt x="10920518" y="0"/>
+                    <a:pt x="10920451" y="0"/>
                   </a:lnTo>
                 </a:path>
               </a:pathLst>
@@ -3601,21 +3601,21 @@
           </p:nvSpPr>
           <p:spPr>
             <a:xfrm>
-              <a:off x="793905" y="3732172"/>
-              <a:ext cx="10920518" cy="0"/>
+              <a:off x="793972" y="3732164"/>
+              <a:ext cx="10920451" cy="0"/>
             </a:xfrm>
             <a:custGeom>
               <a:avLst/>
               <a:pathLst>
-                <a:path w="10920518" h="0">
+                <a:path w="10920451" h="0">
                   <a:moveTo>
                     <a:pt x="0" y="0"/>
                   </a:moveTo>
                   <a:lnTo>
-                    <a:pt x="10920518" y="0"/>
+                    <a:pt x="10920451" y="0"/>
                   </a:lnTo>
                   <a:lnTo>
-                    <a:pt x="10920518" y="0"/>
+                    <a:pt x="10920451" y="0"/>
                   </a:lnTo>
                 </a:path>
               </a:pathLst>
@@ -3644,21 +3644,21 @@
           </p:nvSpPr>
           <p:spPr>
             <a:xfrm>
-              <a:off x="793905" y="2994828"/>
-              <a:ext cx="10920518" cy="0"/>
+              <a:off x="793972" y="2994823"/>
+              <a:ext cx="10920451" cy="0"/>
             </a:xfrm>
             <a:custGeom>
               <a:avLst/>
               <a:pathLst>
-                <a:path w="10920518" h="0">
+                <a:path w="10920451" h="0">
                   <a:moveTo>
                     <a:pt x="0" y="0"/>
                   </a:moveTo>
                   <a:lnTo>
-                    <a:pt x="10920518" y="0"/>
+                    <a:pt x="10920451" y="0"/>
                   </a:lnTo>
                   <a:lnTo>
-                    <a:pt x="10920518" y="0"/>
+                    <a:pt x="10920451" y="0"/>
                   </a:lnTo>
                 </a:path>
               </a:pathLst>
@@ -3687,21 +3687,21 @@
           </p:nvSpPr>
           <p:spPr>
             <a:xfrm>
-              <a:off x="793905" y="2257484"/>
-              <a:ext cx="10920518" cy="0"/>
+              <a:off x="793972" y="2257482"/>
+              <a:ext cx="10920451" cy="0"/>
             </a:xfrm>
             <a:custGeom>
               <a:avLst/>
               <a:pathLst>
-                <a:path w="10920518" h="0">
+                <a:path w="10920451" h="0">
                   <a:moveTo>
                     <a:pt x="0" y="0"/>
                   </a:moveTo>
                   <a:lnTo>
-                    <a:pt x="10920518" y="0"/>
+                    <a:pt x="10920451" y="0"/>
                   </a:lnTo>
                   <a:lnTo>
-                    <a:pt x="10920518" y="0"/>
+                    <a:pt x="10920451" y="0"/>
                   </a:lnTo>
                 </a:path>
               </a:pathLst>
@@ -3730,15 +3730,15 @@
           </p:nvSpPr>
           <p:spPr>
             <a:xfrm>
-              <a:off x="1257292" y="1877752"/>
-              <a:ext cx="0" cy="3812069"/>
+              <a:off x="1257357" y="1877752"/>
+              <a:ext cx="0" cy="3812052"/>
             </a:xfrm>
             <a:custGeom>
               <a:avLst/>
               <a:pathLst>
-                <a:path w="0" h="3812069">
+                <a:path w="0" h="3812052">
                   <a:moveTo>
-                    <a:pt x="0" y="3812069"/>
+                    <a:pt x="0" y="3812052"/>
                   </a:moveTo>
                   <a:lnTo>
                     <a:pt x="0" y="0"/>
@@ -3773,15 +3773,15 @@
           </p:nvSpPr>
           <p:spPr>
             <a:xfrm>
-              <a:off x="3795708" y="1877752"/>
-              <a:ext cx="0" cy="3812069"/>
+              <a:off x="3795757" y="1877752"/>
+              <a:ext cx="0" cy="3812052"/>
             </a:xfrm>
             <a:custGeom>
               <a:avLst/>
               <a:pathLst>
-                <a:path w="0" h="3812069">
+                <a:path w="0" h="3812052">
                   <a:moveTo>
-                    <a:pt x="0" y="3812069"/>
+                    <a:pt x="0" y="3812052"/>
                   </a:moveTo>
                   <a:lnTo>
                     <a:pt x="0" y="0"/>
@@ -3816,15 +3816,15 @@
           </p:nvSpPr>
           <p:spPr>
             <a:xfrm>
-              <a:off x="6334124" y="1877752"/>
-              <a:ext cx="0" cy="3812069"/>
+              <a:off x="6334157" y="1877752"/>
+              <a:ext cx="0" cy="3812052"/>
             </a:xfrm>
             <a:custGeom>
               <a:avLst/>
               <a:pathLst>
-                <a:path w="0" h="3812069">
+                <a:path w="0" h="3812052">
                   <a:moveTo>
-                    <a:pt x="0" y="3812069"/>
+                    <a:pt x="0" y="3812052"/>
                   </a:moveTo>
                   <a:lnTo>
                     <a:pt x="0" y="0"/>
@@ -3859,15 +3859,15 @@
           </p:nvSpPr>
           <p:spPr>
             <a:xfrm>
-              <a:off x="8872540" y="1877752"/>
-              <a:ext cx="0" cy="3812069"/>
+              <a:off x="8872557" y="1877752"/>
+              <a:ext cx="0" cy="3812052"/>
             </a:xfrm>
             <a:custGeom>
               <a:avLst/>
               <a:pathLst>
-                <a:path w="0" h="3812069">
+                <a:path w="0" h="3812052">
                   <a:moveTo>
-                    <a:pt x="0" y="3812069"/>
+                    <a:pt x="0" y="3812052"/>
                   </a:moveTo>
                   <a:lnTo>
                     <a:pt x="0" y="0"/>
@@ -3902,15 +3902,15 @@
           </p:nvSpPr>
           <p:spPr>
             <a:xfrm>
-              <a:off x="11410956" y="1877752"/>
-              <a:ext cx="0" cy="3812069"/>
+              <a:off x="11410958" y="1877752"/>
+              <a:ext cx="0" cy="3812052"/>
             </a:xfrm>
             <a:custGeom>
               <a:avLst/>
               <a:pathLst>
-                <a:path w="0" h="3812069">
+                <a:path w="0" h="3812052">
                   <a:moveTo>
-                    <a:pt x="0" y="3812069"/>
+                    <a:pt x="0" y="3812052"/>
                   </a:moveTo>
                   <a:lnTo>
                     <a:pt x="0" y="0"/>
@@ -3945,21 +3945,21 @@
           </p:nvSpPr>
           <p:spPr>
             <a:xfrm>
-              <a:off x="793905" y="5575533"/>
-              <a:ext cx="10920518" cy="0"/>
+              <a:off x="793972" y="5575516"/>
+              <a:ext cx="10920451" cy="0"/>
             </a:xfrm>
             <a:custGeom>
               <a:avLst/>
               <a:pathLst>
-                <a:path w="10920518" h="0">
+                <a:path w="10920451" h="0">
                   <a:moveTo>
                     <a:pt x="0" y="0"/>
                   </a:moveTo>
                   <a:lnTo>
-                    <a:pt x="10920518" y="0"/>
+                    <a:pt x="10920451" y="0"/>
                   </a:lnTo>
                   <a:lnTo>
-                    <a:pt x="10920518" y="0"/>
+                    <a:pt x="10920451" y="0"/>
                   </a:lnTo>
                 </a:path>
               </a:pathLst>
@@ -3988,21 +3988,21 @@
           </p:nvSpPr>
           <p:spPr>
             <a:xfrm>
-              <a:off x="793905" y="4838189"/>
-              <a:ext cx="10920518" cy="0"/>
+              <a:off x="793972" y="4838175"/>
+              <a:ext cx="10920451" cy="0"/>
             </a:xfrm>
             <a:custGeom>
               <a:avLst/>
               <a:pathLst>
-                <a:path w="10920518" h="0">
+                <a:path w="10920451" h="0">
                   <a:moveTo>
                     <a:pt x="0" y="0"/>
                   </a:moveTo>
                   <a:lnTo>
-                    <a:pt x="10920518" y="0"/>
+                    <a:pt x="10920451" y="0"/>
                   </a:lnTo>
                   <a:lnTo>
-                    <a:pt x="10920518" y="0"/>
+                    <a:pt x="10920451" y="0"/>
                   </a:lnTo>
                 </a:path>
               </a:pathLst>
@@ -4031,21 +4031,21 @@
           </p:nvSpPr>
           <p:spPr>
             <a:xfrm>
-              <a:off x="793905" y="4100845"/>
-              <a:ext cx="10920518" cy="0"/>
+              <a:off x="793972" y="4100834"/>
+              <a:ext cx="10920451" cy="0"/>
             </a:xfrm>
             <a:custGeom>
               <a:avLst/>
               <a:pathLst>
-                <a:path w="10920518" h="0">
+                <a:path w="10920451" h="0">
                   <a:moveTo>
                     <a:pt x="0" y="0"/>
                   </a:moveTo>
                   <a:lnTo>
-                    <a:pt x="10920518" y="0"/>
+                    <a:pt x="10920451" y="0"/>
                   </a:lnTo>
                   <a:lnTo>
-                    <a:pt x="10920518" y="0"/>
+                    <a:pt x="10920451" y="0"/>
                   </a:lnTo>
                 </a:path>
               </a:pathLst>
@@ -4074,21 +4074,21 @@
           </p:nvSpPr>
           <p:spPr>
             <a:xfrm>
-              <a:off x="793905" y="3363500"/>
-              <a:ext cx="10920518" cy="0"/>
+              <a:off x="793972" y="3363494"/>
+              <a:ext cx="10920451" cy="0"/>
             </a:xfrm>
             <a:custGeom>
               <a:avLst/>
               <a:pathLst>
-                <a:path w="10920518" h="0">
+                <a:path w="10920451" h="0">
                   <a:moveTo>
                     <a:pt x="0" y="0"/>
                   </a:moveTo>
                   <a:lnTo>
-                    <a:pt x="10920518" y="0"/>
+                    <a:pt x="10920451" y="0"/>
                   </a:lnTo>
                   <a:lnTo>
-                    <a:pt x="10920518" y="0"/>
+                    <a:pt x="10920451" y="0"/>
                   </a:lnTo>
                 </a:path>
               </a:pathLst>
@@ -4117,21 +4117,21 @@
           </p:nvSpPr>
           <p:spPr>
             <a:xfrm>
-              <a:off x="793905" y="2626156"/>
-              <a:ext cx="10920518" cy="0"/>
+              <a:off x="793972" y="2626153"/>
+              <a:ext cx="10920451" cy="0"/>
             </a:xfrm>
             <a:custGeom>
               <a:avLst/>
               <a:pathLst>
-                <a:path w="10920518" h="0">
+                <a:path w="10920451" h="0">
                   <a:moveTo>
                     <a:pt x="0" y="0"/>
                   </a:moveTo>
                   <a:lnTo>
-                    <a:pt x="10920518" y="0"/>
+                    <a:pt x="10920451" y="0"/>
                   </a:lnTo>
                   <a:lnTo>
-                    <a:pt x="10920518" y="0"/>
+                    <a:pt x="10920451" y="0"/>
                   </a:lnTo>
                 </a:path>
               </a:pathLst>
@@ -4160,21 +4160,21 @@
           </p:nvSpPr>
           <p:spPr>
             <a:xfrm>
-              <a:off x="793905" y="1888812"/>
-              <a:ext cx="10920518" cy="0"/>
+              <a:off x="793972" y="1888812"/>
+              <a:ext cx="10920451" cy="0"/>
             </a:xfrm>
             <a:custGeom>
               <a:avLst/>
               <a:pathLst>
-                <a:path w="10920518" h="0">
+                <a:path w="10920451" h="0">
                   <a:moveTo>
                     <a:pt x="0" y="0"/>
                   </a:moveTo>
                   <a:lnTo>
-                    <a:pt x="10920518" y="0"/>
+                    <a:pt x="10920451" y="0"/>
                   </a:lnTo>
                   <a:lnTo>
-                    <a:pt x="10920518" y="0"/>
+                    <a:pt x="10920451" y="0"/>
                   </a:lnTo>
                 </a:path>
               </a:pathLst>
@@ -4203,15 +4203,15 @@
           </p:nvSpPr>
           <p:spPr>
             <a:xfrm>
-              <a:off x="2526500" y="1877752"/>
-              <a:ext cx="0" cy="3812069"/>
+              <a:off x="2526557" y="1877752"/>
+              <a:ext cx="0" cy="3812052"/>
             </a:xfrm>
             <a:custGeom>
               <a:avLst/>
               <a:pathLst>
-                <a:path w="0" h="3812069">
+                <a:path w="0" h="3812052">
                   <a:moveTo>
-                    <a:pt x="0" y="3812069"/>
+                    <a:pt x="0" y="3812052"/>
                   </a:moveTo>
                   <a:lnTo>
                     <a:pt x="0" y="0"/>
@@ -4246,15 +4246,15 @@
           </p:nvSpPr>
           <p:spPr>
             <a:xfrm>
-              <a:off x="5064916" y="1877752"/>
-              <a:ext cx="0" cy="3812069"/>
+              <a:off x="5064957" y="1877752"/>
+              <a:ext cx="0" cy="3812052"/>
             </a:xfrm>
             <a:custGeom>
               <a:avLst/>
               <a:pathLst>
-                <a:path w="0" h="3812069">
+                <a:path w="0" h="3812052">
                   <a:moveTo>
-                    <a:pt x="0" y="3812069"/>
+                    <a:pt x="0" y="3812052"/>
                   </a:moveTo>
                   <a:lnTo>
                     <a:pt x="0" y="0"/>
@@ -4289,15 +4289,15 @@
           </p:nvSpPr>
           <p:spPr>
             <a:xfrm>
-              <a:off x="7603332" y="1877752"/>
-              <a:ext cx="0" cy="3812069"/>
+              <a:off x="7603357" y="1877752"/>
+              <a:ext cx="0" cy="3812052"/>
             </a:xfrm>
             <a:custGeom>
               <a:avLst/>
               <a:pathLst>
-                <a:path w="0" h="3812069">
+                <a:path w="0" h="3812052">
                   <a:moveTo>
-                    <a:pt x="0" y="3812069"/>
+                    <a:pt x="0" y="3812052"/>
                   </a:moveTo>
                   <a:lnTo>
                     <a:pt x="0" y="0"/>
@@ -4332,15 +4332,15 @@
           </p:nvSpPr>
           <p:spPr>
             <a:xfrm>
-              <a:off x="10141748" y="1877752"/>
-              <a:ext cx="0" cy="3812069"/>
+              <a:off x="10141758" y="1877752"/>
+              <a:ext cx="0" cy="3812052"/>
             </a:xfrm>
             <a:custGeom>
               <a:avLst/>
               <a:pathLst>
-                <a:path w="0" h="3812069">
+                <a:path w="0" h="3812052">
                   <a:moveTo>
-                    <a:pt x="0" y="3812069"/>
+                    <a:pt x="0" y="3812052"/>
                   </a:moveTo>
                   <a:lnTo>
                     <a:pt x="0" y="0"/>
@@ -4375,7 +4375,7 @@
           </p:nvSpPr>
           <p:spPr>
             <a:xfrm>
-              <a:off x="4067243" y="3920301"/>
+              <a:off x="4067290" y="3920291"/>
               <a:ext cx="66150" cy="66150"/>
             </a:xfrm>
             <a:prstGeom prst="ellipse">
@@ -4410,7 +4410,7 @@
           </p:nvSpPr>
           <p:spPr>
             <a:xfrm>
-              <a:off x="4714539" y="3920301"/>
+              <a:off x="4714582" y="3920291"/>
               <a:ext cx="66150" cy="66150"/>
             </a:xfrm>
             <a:prstGeom prst="ellipse">
@@ -4445,7 +4445,7 @@
           </p:nvSpPr>
           <p:spPr>
             <a:xfrm>
-              <a:off x="3305718" y="3654857"/>
+              <a:off x="3305770" y="3654849"/>
               <a:ext cx="66150" cy="66150"/>
             </a:xfrm>
             <a:prstGeom prst="ellipse">
@@ -4480,7 +4480,7 @@
           </p:nvSpPr>
           <p:spPr>
             <a:xfrm>
-              <a:off x="5577601" y="3861313"/>
+              <a:off x="5577638" y="3861304"/>
               <a:ext cx="66150" cy="66150"/>
             </a:xfrm>
             <a:prstGeom prst="ellipse">
@@ -4515,7 +4515,7 @@
           </p:nvSpPr>
           <p:spPr>
             <a:xfrm>
-              <a:off x="6148744" y="4259479"/>
+              <a:off x="6148778" y="4259468"/>
               <a:ext cx="66150" cy="66150"/>
             </a:xfrm>
             <a:prstGeom prst="ellipse">
@@ -4550,7 +4550,7 @@
           </p:nvSpPr>
           <p:spPr>
             <a:xfrm>
-              <a:off x="6199512" y="4347960"/>
+              <a:off x="6199546" y="4347949"/>
               <a:ext cx="66150" cy="66150"/>
             </a:xfrm>
             <a:prstGeom prst="ellipse">
@@ -4585,7 +4585,7 @@
           </p:nvSpPr>
           <p:spPr>
             <a:xfrm>
-              <a:off x="6478738" y="4908342"/>
+              <a:off x="6478770" y="4908328"/>
               <a:ext cx="66150" cy="66150"/>
             </a:xfrm>
             <a:prstGeom prst="ellipse">
@@ -4620,7 +4620,7 @@
           </p:nvSpPr>
           <p:spPr>
             <a:xfrm>
-              <a:off x="5514140" y="3418907"/>
+              <a:off x="5514178" y="3418899"/>
               <a:ext cx="66150" cy="66150"/>
             </a:xfrm>
             <a:prstGeom prst="ellipse">
@@ -4655,7 +4655,7 @@
           </p:nvSpPr>
           <p:spPr>
             <a:xfrm>
-              <a:off x="5412604" y="3654857"/>
+              <a:off x="5412642" y="3654849"/>
               <a:ext cx="66150" cy="66150"/>
             </a:xfrm>
             <a:prstGeom prst="ellipse">
@@ -4690,7 +4690,7 @@
           </p:nvSpPr>
           <p:spPr>
             <a:xfrm>
-              <a:off x="6148744" y="4185745"/>
+              <a:off x="6148778" y="4185734"/>
               <a:ext cx="66150" cy="66150"/>
             </a:xfrm>
             <a:prstGeom prst="ellipse">
@@ -4725,7 +4725,7 @@
           </p:nvSpPr>
           <p:spPr>
             <a:xfrm>
-              <a:off x="6148744" y="4392201"/>
+              <a:off x="6148778" y="4392189"/>
               <a:ext cx="66150" cy="66150"/>
             </a:xfrm>
             <a:prstGeom prst="ellipse">
@@ -4760,7 +4760,7 @@
           </p:nvSpPr>
           <p:spPr>
             <a:xfrm>
-              <a:off x="7747946" y="4598657"/>
+              <a:off x="7747970" y="4598645"/>
               <a:ext cx="66150" cy="66150"/>
             </a:xfrm>
             <a:prstGeom prst="ellipse">
@@ -4795,7 +4795,7 @@
           </p:nvSpPr>
           <p:spPr>
             <a:xfrm>
-              <a:off x="6884885" y="4465935"/>
+              <a:off x="6884914" y="4465924"/>
               <a:ext cx="66150" cy="66150"/>
             </a:xfrm>
             <a:prstGeom prst="ellipse">
@@ -4830,7 +4830,7 @@
           </p:nvSpPr>
           <p:spPr>
             <a:xfrm>
-              <a:off x="7011806" y="4775620"/>
+              <a:off x="7011834" y="4775607"/>
               <a:ext cx="66150" cy="66150"/>
             </a:xfrm>
             <a:prstGeom prst="ellipse">
@@ -4865,7 +4865,7 @@
           </p:nvSpPr>
           <p:spPr>
             <a:xfrm>
-              <a:off x="10743277" y="5483471"/>
+              <a:off x="10743283" y="5483454"/>
               <a:ext cx="66150" cy="66150"/>
             </a:xfrm>
             <a:prstGeom prst="ellipse">
@@ -4900,7 +4900,7 @@
           </p:nvSpPr>
           <p:spPr>
             <a:xfrm>
-              <a:off x="11184961" y="5483471"/>
+              <a:off x="11184964" y="5483454"/>
               <a:ext cx="66150" cy="66150"/>
             </a:xfrm>
             <a:prstGeom prst="ellipse">
@@ -4935,7 +4935,7 @@
           </p:nvSpPr>
           <p:spPr>
             <a:xfrm>
-              <a:off x="10984426" y="4849354"/>
+              <a:off x="10984431" y="4849341"/>
               <a:ext cx="66150" cy="66150"/>
             </a:xfrm>
             <a:prstGeom prst="ellipse">
@@ -4970,7 +4970,7 @@
           </p:nvSpPr>
           <p:spPr>
             <a:xfrm>
-              <a:off x="3001108" y="2239156"/>
+              <a:off x="3001162" y="2239154"/>
               <a:ext cx="66150" cy="66150"/>
             </a:xfrm>
             <a:prstGeom prst="ellipse">
@@ -5005,7 +5005,7 @@
           </p:nvSpPr>
           <p:spPr>
             <a:xfrm>
-              <a:off x="1516135" y="2534093"/>
+              <a:off x="1516198" y="2534090"/>
               <a:ext cx="66150" cy="66150"/>
             </a:xfrm>
             <a:prstGeom prst="ellipse">
@@ -5040,7 +5040,7 @@
           </p:nvSpPr>
           <p:spPr>
             <a:xfrm>
-              <a:off x="2074587" y="2017952"/>
+              <a:off x="2074646" y="2017952"/>
               <a:ext cx="66150" cy="66150"/>
             </a:xfrm>
             <a:prstGeom prst="ellipse">
@@ -5075,7 +5075,7 @@
           </p:nvSpPr>
           <p:spPr>
             <a:xfrm>
-              <a:off x="3673789" y="3846566"/>
+              <a:off x="3673838" y="3846557"/>
               <a:ext cx="66150" cy="66150"/>
             </a:xfrm>
             <a:prstGeom prst="ellipse">
@@ -5110,7 +5110,7 @@
           </p:nvSpPr>
           <p:spPr>
             <a:xfrm>
-              <a:off x="6351817" y="4731379"/>
+              <a:off x="6351850" y="4731366"/>
               <a:ext cx="66150" cy="66150"/>
             </a:xfrm>
             <a:prstGeom prst="ellipse">
@@ -5145,7 +5145,7 @@
           </p:nvSpPr>
           <p:spPr>
             <a:xfrm>
-              <a:off x="6136052" y="4775620"/>
+              <a:off x="6136086" y="4775607"/>
               <a:ext cx="66150" cy="66150"/>
             </a:xfrm>
             <a:prstGeom prst="ellipse">
@@ -5180,7 +5180,7 @@
           </p:nvSpPr>
           <p:spPr>
             <a:xfrm>
-              <a:off x="7164110" y="5055811"/>
+              <a:off x="7164138" y="5055796"/>
               <a:ext cx="66150" cy="66150"/>
             </a:xfrm>
             <a:prstGeom prst="ellipse">
@@ -5215,7 +5215,7 @@
           </p:nvSpPr>
           <p:spPr>
             <a:xfrm>
-              <a:off x="7176803" y="4185745"/>
+              <a:off x="7176830" y="4185734"/>
               <a:ext cx="66150" cy="66150"/>
             </a:xfrm>
             <a:prstGeom prst="ellipse">
@@ -5250,7 +5250,7 @@
           </p:nvSpPr>
           <p:spPr>
             <a:xfrm>
-              <a:off x="2328428" y="2991247"/>
+              <a:off x="2328486" y="2991242"/>
               <a:ext cx="66150" cy="66150"/>
             </a:xfrm>
             <a:prstGeom prst="ellipse">
@@ -5285,7 +5285,7 @@
           </p:nvSpPr>
           <p:spPr>
             <a:xfrm>
-              <a:off x="2848804" y="3182956"/>
+              <a:off x="2848858" y="3182950"/>
               <a:ext cx="66150" cy="66150"/>
             </a:xfrm>
             <a:prstGeom prst="ellipse">
@@ -5320,7 +5320,7 @@
           </p:nvSpPr>
           <p:spPr>
             <a:xfrm>
-              <a:off x="1257217" y="2534093"/>
+              <a:off x="1257281" y="2534090"/>
               <a:ext cx="66150" cy="66150"/>
             </a:xfrm>
             <a:prstGeom prst="ellipse">
@@ -5355,7 +5355,7 @@
           </p:nvSpPr>
           <p:spPr>
             <a:xfrm>
-              <a:off x="5463372" y="4687139"/>
+              <a:off x="5463410" y="4687126"/>
               <a:ext cx="66150" cy="66150"/>
             </a:xfrm>
             <a:prstGeom prst="ellipse">
@@ -5390,7 +5390,7 @@
           </p:nvSpPr>
           <p:spPr>
             <a:xfrm>
-              <a:off x="4448006" y="4112010"/>
+              <a:off x="4448050" y="4112000"/>
               <a:ext cx="66150" cy="66150"/>
             </a:xfrm>
             <a:prstGeom prst="ellipse">
@@ -5425,7 +5425,7 @@
           </p:nvSpPr>
           <p:spPr>
             <a:xfrm>
-              <a:off x="6478738" y="4805114"/>
+              <a:off x="6478770" y="4805100"/>
               <a:ext cx="66150" cy="66150"/>
             </a:xfrm>
             <a:prstGeom prst="ellipse">
@@ -5460,7 +5460,7 @@
           </p:nvSpPr>
           <p:spPr>
             <a:xfrm>
-              <a:off x="4473390" y="3861313"/>
+              <a:off x="4473434" y="3861304"/>
               <a:ext cx="66150" cy="66150"/>
             </a:xfrm>
             <a:prstGeom prst="ellipse">
@@ -5495,8 +5495,8 @@
           </p:nvSpPr>
           <p:spPr>
             <a:xfrm>
-              <a:off x="606963" y="5535342"/>
-              <a:ext cx="124311" cy="80272"/>
+              <a:off x="606983" y="5535466"/>
+              <a:ext cx="124358" cy="80101"/>
             </a:xfrm>
             <a:prstGeom prst="rect">
               <a:avLst/>
@@ -5541,8 +5541,8 @@
           </p:nvSpPr>
           <p:spPr>
             <a:xfrm>
-              <a:off x="606963" y="4798489"/>
-              <a:ext cx="124311" cy="79781"/>
+              <a:off x="606983" y="4798125"/>
+              <a:ext cx="124358" cy="80101"/>
             </a:xfrm>
             <a:prstGeom prst="rect">
               <a:avLst/>
@@ -5587,8 +5587,8 @@
           </p:nvSpPr>
           <p:spPr>
             <a:xfrm>
-              <a:off x="606963" y="4060381"/>
-              <a:ext cx="124311" cy="80545"/>
+              <a:off x="606983" y="4060784"/>
+              <a:ext cx="124358" cy="80101"/>
             </a:xfrm>
             <a:prstGeom prst="rect">
               <a:avLst/>
@@ -5633,8 +5633,8 @@
           </p:nvSpPr>
           <p:spPr>
             <a:xfrm>
-              <a:off x="606963" y="3323200"/>
-              <a:ext cx="124311" cy="80382"/>
+              <a:off x="606983" y="3323443"/>
+              <a:ext cx="124358" cy="80101"/>
             </a:xfrm>
             <a:prstGeom prst="rect">
               <a:avLst/>
@@ -5679,8 +5679,8 @@
           </p:nvSpPr>
           <p:spPr>
             <a:xfrm>
-              <a:off x="606963" y="2585856"/>
-              <a:ext cx="124311" cy="80382"/>
+              <a:off x="606983" y="2586102"/>
+              <a:ext cx="124358" cy="80101"/>
             </a:xfrm>
             <a:prstGeom prst="rect">
               <a:avLst/>
@@ -5725,8 +5725,8 @@
           </p:nvSpPr>
           <p:spPr>
             <a:xfrm>
-              <a:off x="606963" y="1848512"/>
-              <a:ext cx="124311" cy="80382"/>
+              <a:off x="606983" y="1848761"/>
+              <a:ext cx="124358" cy="80101"/>
             </a:xfrm>
             <a:prstGeom prst="rect">
               <a:avLst/>
@@ -5771,7 +5771,7 @@
           </p:nvSpPr>
           <p:spPr>
             <a:xfrm>
-              <a:off x="759110" y="5575533"/>
+              <a:off x="759177" y="5575516"/>
               <a:ext cx="34794" cy="0"/>
             </a:xfrm>
             <a:custGeom>
@@ -5811,7 +5811,7 @@
           </p:nvSpPr>
           <p:spPr>
             <a:xfrm>
-              <a:off x="759110" y="4838189"/>
+              <a:off x="759177" y="4838175"/>
               <a:ext cx="34794" cy="0"/>
             </a:xfrm>
             <a:custGeom>
@@ -5851,7 +5851,7 @@
           </p:nvSpPr>
           <p:spPr>
             <a:xfrm>
-              <a:off x="759110" y="4100845"/>
+              <a:off x="759177" y="4100834"/>
               <a:ext cx="34794" cy="0"/>
             </a:xfrm>
             <a:custGeom>
@@ -5891,7 +5891,7 @@
           </p:nvSpPr>
           <p:spPr>
             <a:xfrm>
-              <a:off x="759110" y="3363500"/>
+              <a:off x="759177" y="3363494"/>
               <a:ext cx="34794" cy="0"/>
             </a:xfrm>
             <a:custGeom>
@@ -5931,7 +5931,7 @@
           </p:nvSpPr>
           <p:spPr>
             <a:xfrm>
-              <a:off x="759110" y="2626156"/>
+              <a:off x="759177" y="2626153"/>
               <a:ext cx="34794" cy="0"/>
             </a:xfrm>
             <a:custGeom>
@@ -5971,7 +5971,7 @@
           </p:nvSpPr>
           <p:spPr>
             <a:xfrm>
-              <a:off x="759110" y="1888812"/>
+              <a:off x="759177" y="1888812"/>
               <a:ext cx="34794" cy="0"/>
             </a:xfrm>
             <a:custGeom>
@@ -6011,7 +6011,7 @@
           </p:nvSpPr>
           <p:spPr>
             <a:xfrm>
-              <a:off x="2526500" y="5689821"/>
+              <a:off x="2526557" y="5689804"/>
               <a:ext cx="0" cy="34794"/>
             </a:xfrm>
             <a:custGeom>
@@ -6051,7 +6051,7 @@
           </p:nvSpPr>
           <p:spPr>
             <a:xfrm>
-              <a:off x="5064916" y="5689821"/>
+              <a:off x="5064957" y="5689804"/>
               <a:ext cx="0" cy="34794"/>
             </a:xfrm>
             <a:custGeom>
@@ -6091,7 +6091,7 @@
           </p:nvSpPr>
           <p:spPr>
             <a:xfrm>
-              <a:off x="7603332" y="5689821"/>
+              <a:off x="7603357" y="5689804"/>
               <a:ext cx="0" cy="34794"/>
             </a:xfrm>
             <a:custGeom>
@@ -6131,7 +6131,7 @@
           </p:nvSpPr>
           <p:spPr>
             <a:xfrm>
-              <a:off x="10141748" y="5689821"/>
+              <a:off x="10141758" y="5689804"/>
               <a:ext cx="0" cy="34794"/>
             </a:xfrm>
             <a:custGeom>
@@ -6171,8 +6171,8 @@
           </p:nvSpPr>
           <p:spPr>
             <a:xfrm>
-              <a:off x="2495423" y="5754198"/>
-              <a:ext cx="62155" cy="78417"/>
+              <a:off x="2495467" y="5752434"/>
+              <a:ext cx="62179" cy="80101"/>
             </a:xfrm>
             <a:prstGeom prst="rect">
               <a:avLst/>
@@ -6217,8 +6217,8 @@
           </p:nvSpPr>
           <p:spPr>
             <a:xfrm>
-              <a:off x="5033838" y="5752233"/>
-              <a:ext cx="62155" cy="80382"/>
+              <a:off x="5033867" y="5752434"/>
+              <a:ext cx="62179" cy="80101"/>
             </a:xfrm>
             <a:prstGeom prst="rect">
               <a:avLst/>
@@ -6263,8 +6263,8 @@
           </p:nvSpPr>
           <p:spPr>
             <a:xfrm>
-              <a:off x="7572254" y="5754252"/>
-              <a:ext cx="62155" cy="78362"/>
+              <a:off x="7572268" y="5752434"/>
+              <a:ext cx="62179" cy="80101"/>
             </a:xfrm>
             <a:prstGeom prst="rect">
               <a:avLst/>
@@ -6309,8 +6309,8 @@
           </p:nvSpPr>
           <p:spPr>
             <a:xfrm>
-              <a:off x="10110670" y="5753816"/>
-              <a:ext cx="62155" cy="78799"/>
+              <a:off x="10110668" y="5752434"/>
+              <a:ext cx="62179" cy="80101"/>
             </a:xfrm>
             <a:prstGeom prst="rect">
               <a:avLst/>
@@ -6355,8 +6355,8 @@
           </p:nvSpPr>
           <p:spPr>
             <a:xfrm>
-              <a:off x="6184314" y="5897724"/>
-              <a:ext cx="139700" cy="94611"/>
+              <a:off x="6184383" y="5892110"/>
+              <a:ext cx="139628" cy="100218"/>
             </a:xfrm>
             <a:prstGeom prst="rect">
               <a:avLst/>
@@ -6401,8 +6401,8 @@
           </p:nvSpPr>
           <p:spPr>
             <a:xfrm rot="-5400000">
-              <a:off x="352523" y="3730922"/>
-              <a:ext cx="271760" cy="105729"/>
+              <a:off x="355247" y="3733669"/>
+              <a:ext cx="271851" cy="100218"/>
             </a:xfrm>
             <a:prstGeom prst="rect">
               <a:avLst/>
@@ -6595,8 +6595,8 @@
           </p:nvSpPr>
           <p:spPr>
             <a:xfrm>
-              <a:off x="576355" y="1899602"/>
-              <a:ext cx="11097929" cy="3556074"/>
+              <a:off x="576320" y="1899602"/>
+              <a:ext cx="11097964" cy="3556109"/>
             </a:xfrm>
             <a:prstGeom prst="rect">
               <a:avLst/>
@@ -6621,21 +6621,21 @@
           </p:nvSpPr>
           <p:spPr>
             <a:xfrm>
-              <a:off x="576355" y="4891487"/>
-              <a:ext cx="11097929" cy="0"/>
+              <a:off x="576320" y="4891517"/>
+              <a:ext cx="11097964" cy="0"/>
             </a:xfrm>
             <a:custGeom>
               <a:avLst/>
               <a:pathLst>
-                <a:path w="11097929" h="0">
+                <a:path w="11097964" h="0">
                   <a:moveTo>
                     <a:pt x="0" y="0"/>
                   </a:moveTo>
                   <a:lnTo>
-                    <a:pt x="11097929" y="0"/>
+                    <a:pt x="11097964" y="0"/>
                   </a:lnTo>
                   <a:lnTo>
-                    <a:pt x="11097929" y="0"/>
+                    <a:pt x="11097964" y="0"/>
                   </a:lnTo>
                 </a:path>
               </a:pathLst>
@@ -6664,21 +6664,21 @@
           </p:nvSpPr>
           <p:spPr>
             <a:xfrm>
-              <a:off x="576355" y="4064897"/>
-              <a:ext cx="11097929" cy="0"/>
+              <a:off x="576320" y="4064918"/>
+              <a:ext cx="11097964" cy="0"/>
             </a:xfrm>
             <a:custGeom>
               <a:avLst/>
               <a:pathLst>
-                <a:path w="11097929" h="0">
+                <a:path w="11097964" h="0">
                   <a:moveTo>
                     <a:pt x="0" y="0"/>
                   </a:moveTo>
                   <a:lnTo>
-                    <a:pt x="11097929" y="0"/>
+                    <a:pt x="11097964" y="0"/>
                   </a:lnTo>
                   <a:lnTo>
-                    <a:pt x="11097929" y="0"/>
+                    <a:pt x="11097964" y="0"/>
                   </a:lnTo>
                 </a:path>
               </a:pathLst>
@@ -6707,21 +6707,21 @@
           </p:nvSpPr>
           <p:spPr>
             <a:xfrm>
-              <a:off x="576355" y="3238307"/>
-              <a:ext cx="11097929" cy="0"/>
+              <a:off x="576320" y="3238320"/>
+              <a:ext cx="11097964" cy="0"/>
             </a:xfrm>
             <a:custGeom>
               <a:avLst/>
               <a:pathLst>
-                <a:path w="11097929" h="0">
+                <a:path w="11097964" h="0">
                   <a:moveTo>
                     <a:pt x="0" y="0"/>
                   </a:moveTo>
                   <a:lnTo>
-                    <a:pt x="11097929" y="0"/>
+                    <a:pt x="11097964" y="0"/>
                   </a:lnTo>
                   <a:lnTo>
-                    <a:pt x="11097929" y="0"/>
+                    <a:pt x="11097964" y="0"/>
                   </a:lnTo>
                 </a:path>
               </a:pathLst>
@@ -6750,21 +6750,21 @@
           </p:nvSpPr>
           <p:spPr>
             <a:xfrm>
-              <a:off x="576355" y="2411717"/>
-              <a:ext cx="11097929" cy="0"/>
+              <a:off x="576320" y="2411722"/>
+              <a:ext cx="11097964" cy="0"/>
             </a:xfrm>
             <a:custGeom>
               <a:avLst/>
               <a:pathLst>
-                <a:path w="11097929" h="0">
+                <a:path w="11097964" h="0">
                   <a:moveTo>
                     <a:pt x="0" y="0"/>
                   </a:moveTo>
                   <a:lnTo>
-                    <a:pt x="11097929" y="0"/>
+                    <a:pt x="11097964" y="0"/>
                   </a:lnTo>
                   <a:lnTo>
-                    <a:pt x="11097929" y="0"/>
+                    <a:pt x="11097964" y="0"/>
                   </a:lnTo>
                 </a:path>
               </a:pathLst>
@@ -6793,7 +6793,7 @@
           </p:nvSpPr>
           <p:spPr>
             <a:xfrm>
-              <a:off x="5598526" y="4345926"/>
+              <a:off x="5598507" y="4345951"/>
               <a:ext cx="66150" cy="66150"/>
             </a:xfrm>
             <a:prstGeom prst="ellipse">
@@ -6828,7 +6828,7 @@
           </p:nvSpPr>
           <p:spPr>
             <a:xfrm>
-              <a:off x="5598526" y="4135146"/>
+              <a:off x="5598507" y="4135168"/>
               <a:ext cx="66150" cy="66150"/>
             </a:xfrm>
             <a:prstGeom prst="ellipse">
@@ -6863,7 +6863,7 @@
           </p:nvSpPr>
           <p:spPr>
             <a:xfrm>
-              <a:off x="6371303" y="4593904"/>
+              <a:off x="6371286" y="4593930"/>
               <a:ext cx="66150" cy="66150"/>
             </a:xfrm>
             <a:prstGeom prst="ellipse">
@@ -6898,7 +6898,7 @@
           </p:nvSpPr>
           <p:spPr>
             <a:xfrm>
-              <a:off x="5770255" y="3854105"/>
+              <a:off x="5770236" y="3854125"/>
               <a:ext cx="66150" cy="66150"/>
             </a:xfrm>
             <a:prstGeom prst="ellipse">
@@ -6933,7 +6933,7 @@
           </p:nvSpPr>
           <p:spPr>
             <a:xfrm>
-              <a:off x="4611090" y="3668122"/>
+              <a:off x="4611068" y="3668140"/>
               <a:ext cx="66150" cy="66150"/>
             </a:xfrm>
             <a:prstGeom prst="ellipse">
@@ -6968,7 +6968,7 @@
           </p:nvSpPr>
           <p:spPr>
             <a:xfrm>
-              <a:off x="4353498" y="3651591"/>
+              <a:off x="4353475" y="3651608"/>
               <a:ext cx="66150" cy="66150"/>
             </a:xfrm>
             <a:prstGeom prst="ellipse">
@@ -7003,7 +7003,7 @@
           </p:nvSpPr>
           <p:spPr>
             <a:xfrm>
-              <a:off x="2722081" y="3560666"/>
+              <a:off x="2722053" y="3560682"/>
               <a:ext cx="66150" cy="66150"/>
             </a:xfrm>
             <a:prstGeom prst="ellipse">
@@ -7038,7 +7038,7 @@
           </p:nvSpPr>
           <p:spPr>
             <a:xfrm>
-              <a:off x="7058215" y="3874770"/>
+              <a:off x="7058201" y="3874790"/>
               <a:ext cx="66150" cy="66150"/>
             </a:xfrm>
             <a:prstGeom prst="ellipse">
@@ -7073,7 +7073,7 @@
           </p:nvSpPr>
           <p:spPr>
             <a:xfrm>
-              <a:off x="6371303" y="3907834"/>
+              <a:off x="6371286" y="3907854"/>
               <a:ext cx="66150" cy="66150"/>
             </a:xfrm>
             <a:prstGeom prst="ellipse">
@@ -7108,7 +7108,7 @@
           </p:nvSpPr>
           <p:spPr>
             <a:xfrm>
-              <a:off x="4825750" y="3668122"/>
+              <a:off x="4825729" y="3668140"/>
               <a:ext cx="66150" cy="66150"/>
             </a:xfrm>
             <a:prstGeom prst="ellipse">
@@ -7143,7 +7143,7 @@
           </p:nvSpPr>
           <p:spPr>
             <a:xfrm>
-              <a:off x="4224702" y="3668122"/>
+              <a:off x="4224678" y="3668140"/>
               <a:ext cx="66150" cy="66150"/>
             </a:xfrm>
             <a:prstGeom prst="ellipse">
@@ -7178,7 +7178,7 @@
           </p:nvSpPr>
           <p:spPr>
             <a:xfrm>
-              <a:off x="3623653" y="3147371"/>
+              <a:off x="3623628" y="3147383"/>
               <a:ext cx="66150" cy="66150"/>
             </a:xfrm>
             <a:prstGeom prst="ellipse">
@@ -7213,7 +7213,7 @@
           </p:nvSpPr>
           <p:spPr>
             <a:xfrm>
-              <a:off x="4010041" y="3428411"/>
+              <a:off x="4010017" y="3428427"/>
               <a:ext cx="66150" cy="66150"/>
             </a:xfrm>
             <a:prstGeom prst="ellipse">
@@ -7248,7 +7248,7 @@
           </p:nvSpPr>
           <p:spPr>
             <a:xfrm>
-              <a:off x="3108469" y="3387082"/>
+              <a:off x="3108442" y="3387097"/>
               <a:ext cx="66150" cy="66150"/>
             </a:xfrm>
             <a:prstGeom prst="ellipse">
@@ -7283,7 +7283,7 @@
           </p:nvSpPr>
           <p:spPr>
             <a:xfrm>
-              <a:off x="1047731" y="2171994"/>
+              <a:off x="1047698" y="2171997"/>
               <a:ext cx="66150" cy="66150"/>
             </a:xfrm>
             <a:prstGeom prst="ellipse">
@@ -7318,7 +7318,7 @@
           </p:nvSpPr>
           <p:spPr>
             <a:xfrm>
-              <a:off x="1047731" y="2028167"/>
+              <a:off x="1047698" y="2028169"/>
               <a:ext cx="66150" cy="66150"/>
             </a:xfrm>
             <a:prstGeom prst="ellipse">
@@ -7353,7 +7353,7 @@
           </p:nvSpPr>
           <p:spPr>
             <a:xfrm>
-              <a:off x="2893809" y="2093468"/>
+              <a:off x="2893781" y="2093470"/>
               <a:ext cx="66150" cy="66150"/>
             </a:xfrm>
             <a:prstGeom prst="ellipse">
@@ -7388,7 +7388,7 @@
           </p:nvSpPr>
           <p:spPr>
             <a:xfrm>
-              <a:off x="10492778" y="4693094"/>
+              <a:off x="10492774" y="4693122"/>
               <a:ext cx="66150" cy="66150"/>
             </a:xfrm>
             <a:prstGeom prst="ellipse">
@@ -7423,7 +7423,7 @@
           </p:nvSpPr>
           <p:spPr>
             <a:xfrm>
-              <a:off x="9634137" y="5176650"/>
+              <a:off x="9634131" y="5176682"/>
               <a:ext cx="66150" cy="66150"/>
             </a:xfrm>
             <a:prstGeom prst="ellipse">
@@ -7458,7 +7458,7 @@
           </p:nvSpPr>
           <p:spPr>
             <a:xfrm>
-              <a:off x="11136758" y="4994800"/>
+              <a:off x="11136757" y="4994831"/>
               <a:ext cx="66150" cy="66150"/>
             </a:xfrm>
             <a:prstGeom prst="ellipse">
@@ -7493,7 +7493,7 @@
           </p:nvSpPr>
           <p:spPr>
             <a:xfrm>
-              <a:off x="5813187" y="4474048"/>
+              <a:off x="5813168" y="4474074"/>
               <a:ext cx="66150" cy="66150"/>
             </a:xfrm>
             <a:prstGeom prst="ellipse">
@@ -7528,7 +7528,7 @@
           </p:nvSpPr>
           <p:spPr>
             <a:xfrm>
-              <a:off x="3237265" y="3601995"/>
+              <a:off x="3237238" y="3602012"/>
               <a:ext cx="66150" cy="66150"/>
             </a:xfrm>
             <a:prstGeom prst="ellipse">
@@ -7563,7 +7563,7 @@
           </p:nvSpPr>
           <p:spPr>
             <a:xfrm>
-              <a:off x="3108469" y="3672255"/>
+              <a:off x="3108442" y="3672273"/>
               <a:ext cx="66150" cy="66150"/>
             </a:xfrm>
             <a:prstGeom prst="ellipse">
@@ -7598,7 +7598,7 @@
           </p:nvSpPr>
           <p:spPr>
             <a:xfrm>
-              <a:off x="2292760" y="3337486"/>
+              <a:off x="2292731" y="3337501"/>
               <a:ext cx="66150" cy="66150"/>
             </a:xfrm>
             <a:prstGeom prst="ellipse">
@@ -7633,7 +7633,7 @@
           </p:nvSpPr>
           <p:spPr>
             <a:xfrm>
-              <a:off x="4825750" y="3333353"/>
+              <a:off x="4825729" y="3333368"/>
               <a:ext cx="66150" cy="66150"/>
             </a:xfrm>
             <a:prstGeom prst="ellipse">
@@ -7668,7 +7668,7 @@
           </p:nvSpPr>
           <p:spPr>
             <a:xfrm>
-              <a:off x="8303244" y="4912141"/>
+              <a:off x="8303234" y="4912171"/>
               <a:ext cx="66150" cy="66150"/>
             </a:xfrm>
             <a:prstGeom prst="ellipse">
@@ -7703,7 +7703,7 @@
           </p:nvSpPr>
           <p:spPr>
             <a:xfrm>
-              <a:off x="7745128" y="4742690"/>
+              <a:off x="7745116" y="4742718"/>
               <a:ext cx="66150" cy="66150"/>
             </a:xfrm>
             <a:prstGeom prst="ellipse">
@@ -7738,7 +7738,7 @@
           </p:nvSpPr>
           <p:spPr>
             <a:xfrm>
-              <a:off x="9634137" y="5260962"/>
+              <a:off x="9634131" y="5260995"/>
               <a:ext cx="66150" cy="66150"/>
             </a:xfrm>
             <a:prstGeom prst="ellipse">
@@ -7773,7 +7773,7 @@
           </p:nvSpPr>
           <p:spPr>
             <a:xfrm>
-              <a:off x="3366061" y="3891302"/>
+              <a:off x="3366035" y="3891322"/>
               <a:ext cx="66150" cy="66150"/>
             </a:xfrm>
             <a:prstGeom prst="ellipse">
@@ -7808,7 +7808,7 @@
           </p:nvSpPr>
           <p:spPr>
             <a:xfrm>
-              <a:off x="5040410" y="4221938"/>
+              <a:off x="5040389" y="4221961"/>
               <a:ext cx="66150" cy="66150"/>
             </a:xfrm>
             <a:prstGeom prst="ellipse">
@@ -7843,7 +7843,7 @@
           </p:nvSpPr>
           <p:spPr>
             <a:xfrm>
-              <a:off x="3022605" y="3560666"/>
+              <a:off x="3022578" y="3560682"/>
               <a:ext cx="66150" cy="66150"/>
             </a:xfrm>
             <a:prstGeom prst="ellipse">
@@ -7878,7 +7878,7 @@
           </p:nvSpPr>
           <p:spPr>
             <a:xfrm>
-              <a:off x="5770255" y="4213672"/>
+              <a:off x="5770236" y="4213695"/>
               <a:ext cx="66150" cy="66150"/>
             </a:xfrm>
             <a:prstGeom prst="ellipse">
@@ -7913,8 +7913,8 @@
           </p:nvSpPr>
           <p:spPr>
             <a:xfrm>
-              <a:off x="373303" y="4813074"/>
-              <a:ext cx="127136" cy="160399"/>
+              <a:off x="373303" y="4809541"/>
+              <a:ext cx="127101" cy="163951"/>
             </a:xfrm>
             <a:prstGeom prst="rect">
               <a:avLst/>
@@ -7959,8 +7959,8 @@
           </p:nvSpPr>
           <p:spPr>
             <a:xfrm>
-              <a:off x="373303" y="3982465"/>
-              <a:ext cx="127136" cy="164417"/>
+              <a:off x="373303" y="3982943"/>
+              <a:ext cx="127101" cy="163951"/>
             </a:xfrm>
             <a:prstGeom prst="rect">
               <a:avLst/>
@@ -8005,8 +8005,8 @@
           </p:nvSpPr>
           <p:spPr>
             <a:xfrm>
-              <a:off x="373303" y="3160005"/>
-              <a:ext cx="127136" cy="160287"/>
+              <a:off x="373303" y="3156344"/>
+              <a:ext cx="127101" cy="163951"/>
             </a:xfrm>
             <a:prstGeom prst="rect">
               <a:avLst/>
@@ -8051,8 +8051,8 @@
           </p:nvSpPr>
           <p:spPr>
             <a:xfrm>
-              <a:off x="373303" y="2332521"/>
-              <a:ext cx="127136" cy="161180"/>
+              <a:off x="373303" y="2329746"/>
+              <a:ext cx="127101" cy="163951"/>
             </a:xfrm>
             <a:prstGeom prst="rect">
               <a:avLst/>
@@ -8097,18 +8097,18 @@
           </p:nvSpPr>
           <p:spPr>
             <a:xfrm>
-              <a:off x="576355" y="5455677"/>
-              <a:ext cx="11097929" cy="0"/>
+              <a:off x="576320" y="5455712"/>
+              <a:ext cx="11097964" cy="0"/>
             </a:xfrm>
             <a:custGeom>
               <a:avLst/>
               <a:pathLst>
-                <a:path w="11097929" h="0">
+                <a:path w="11097964" h="0">
                   <a:moveTo>
                     <a:pt x="0" y="0"/>
                   </a:moveTo>
                   <a:lnTo>
-                    <a:pt x="11097929" y="0"/>
+                    <a:pt x="11097964" y="0"/>
                   </a:lnTo>
                 </a:path>
               </a:pathLst>
@@ -8137,7 +8137,7 @@
           </p:nvSpPr>
           <p:spPr>
             <a:xfrm>
-              <a:off x="909078" y="5455677"/>
+              <a:off x="909044" y="5455712"/>
               <a:ext cx="0" cy="56936"/>
             </a:xfrm>
             <a:custGeom>
@@ -8177,7 +8177,7 @@
           </p:nvSpPr>
           <p:spPr>
             <a:xfrm>
-              <a:off x="3055680" y="5455677"/>
+              <a:off x="3055653" y="5455712"/>
               <a:ext cx="0" cy="56936"/>
             </a:xfrm>
             <a:custGeom>
@@ -8217,7 +8217,7 @@
           </p:nvSpPr>
           <p:spPr>
             <a:xfrm>
-              <a:off x="5202281" y="5455677"/>
+              <a:off x="5202261" y="5455712"/>
               <a:ext cx="0" cy="56936"/>
             </a:xfrm>
             <a:custGeom>
@@ -8257,7 +8257,7 @@
           </p:nvSpPr>
           <p:spPr>
             <a:xfrm>
-              <a:off x="7348883" y="5455677"/>
+              <a:off x="7348869" y="5455712"/>
               <a:ext cx="0" cy="56936"/>
             </a:xfrm>
             <a:custGeom>
@@ -8297,7 +8297,7 @@
           </p:nvSpPr>
           <p:spPr>
             <a:xfrm>
-              <a:off x="9495484" y="5455677"/>
+              <a:off x="9495477" y="5455712"/>
               <a:ext cx="0" cy="56936"/>
             </a:xfrm>
             <a:custGeom>
@@ -8337,7 +8337,7 @@
           </p:nvSpPr>
           <p:spPr>
             <a:xfrm>
-              <a:off x="11642085" y="5455677"/>
+              <a:off x="11642085" y="5455712"/>
               <a:ext cx="0" cy="56936"/>
             </a:xfrm>
             <a:custGeom>
@@ -8377,8 +8377,8 @@
           </p:nvSpPr>
           <p:spPr>
             <a:xfrm>
-              <a:off x="781942" y="5588305"/>
-              <a:ext cx="254272" cy="164194"/>
+              <a:off x="781943" y="5588564"/>
+              <a:ext cx="254203" cy="163951"/>
             </a:xfrm>
             <a:prstGeom prst="rect">
               <a:avLst/>
@@ -8423,8 +8423,8 @@
           </p:nvSpPr>
           <p:spPr>
             <a:xfrm>
-              <a:off x="2928543" y="5589310"/>
-              <a:ext cx="254272" cy="163190"/>
+              <a:off x="2928551" y="5588564"/>
+              <a:ext cx="254203" cy="163951"/>
             </a:xfrm>
             <a:prstGeom prst="rect">
               <a:avLst/>
@@ -8469,8 +8469,8 @@
           </p:nvSpPr>
           <p:spPr>
             <a:xfrm>
-              <a:off x="5075145" y="5587747"/>
-              <a:ext cx="254272" cy="164752"/>
+              <a:off x="5075159" y="5588564"/>
+              <a:ext cx="254203" cy="163951"/>
             </a:xfrm>
             <a:prstGeom prst="rect">
               <a:avLst/>
@@ -8515,8 +8515,8 @@
           </p:nvSpPr>
           <p:spPr>
             <a:xfrm>
-              <a:off x="7221746" y="5588082"/>
-              <a:ext cx="254272" cy="164417"/>
+              <a:off x="7221767" y="5588564"/>
+              <a:ext cx="254203" cy="163951"/>
             </a:xfrm>
             <a:prstGeom prst="rect">
               <a:avLst/>
@@ -8561,8 +8561,8 @@
           </p:nvSpPr>
           <p:spPr>
             <a:xfrm>
-              <a:off x="9368348" y="5588082"/>
-              <a:ext cx="254272" cy="164417"/>
+              <a:off x="9368376" y="5588564"/>
+              <a:ext cx="254203" cy="163951"/>
             </a:xfrm>
             <a:prstGeom prst="rect">
               <a:avLst/>
@@ -8607,8 +8607,8 @@
           </p:nvSpPr>
           <p:spPr>
             <a:xfrm>
-              <a:off x="11514949" y="5588082"/>
-              <a:ext cx="254272" cy="164417"/>
+              <a:off x="11514984" y="5588564"/>
+              <a:ext cx="254203" cy="163951"/>
             </a:xfrm>
             <a:prstGeom prst="rect">
               <a:avLst/>
@@ -8653,8 +8653,8 @@
           </p:nvSpPr>
           <p:spPr>
             <a:xfrm>
-              <a:off x="5902971" y="5850959"/>
-              <a:ext cx="444698" cy="173012"/>
+              <a:off x="5902966" y="5860018"/>
+              <a:ext cx="444672" cy="163951"/>
             </a:xfrm>
             <a:prstGeom prst="rect">
               <a:avLst/>

</xml_diff>